<commit_message>
Presentation fix with gitignore ~$....*.pptx
</commit_message>
<xml_diff>
--- a/Bilder.pptx
+++ b/Bilder.pptx
@@ -5,7 +5,7 @@
     <p:sldMasterId id="2147483648" r:id="rId1"/>
   </p:sldMasterIdLst>
   <p:notesMasterIdLst>
-    <p:notesMasterId r:id="rId41"/>
+    <p:notesMasterId r:id="rId44"/>
   </p:notesMasterIdLst>
   <p:sldIdLst>
     <p:sldId id="259" r:id="rId2"/>
@@ -47,6 +47,9 @@
     <p:sldId id="294" r:id="rId38"/>
     <p:sldId id="295" r:id="rId39"/>
     <p:sldId id="296" r:id="rId40"/>
+    <p:sldId id="297" r:id="rId41"/>
+    <p:sldId id="299" r:id="rId42"/>
+    <p:sldId id="298" r:id="rId43"/>
   </p:sldIdLst>
   <p:sldSz cx="9144000" cy="6858000" type="screen4x3"/>
   <p:notesSz cx="6858000" cy="9144000"/>
@@ -230,7 +233,7 @@
           <a:p>
             <a:fld id="{F0AA02DF-FD44-42A9-84A3-8EFDA1A9726E}" type="datetimeFigureOut">
               <a:rPr lang="en-US" smtClean="0"/>
-              <a:t>3/24/2017</a:t>
+              <a:t>3/29/2017</a:t>
             </a:fld>
             <a:endParaRPr lang="en-US"/>
           </a:p>
@@ -763,7 +766,7 @@
           <a:p>
             <a:fld id="{1A5CED13-31F0-4FC3-8F7A-2DEE65BE5627}" type="datetimeFigureOut">
               <a:rPr lang="en-US" smtClean="0"/>
-              <a:t>3/24/2017</a:t>
+              <a:t>3/29/2017</a:t>
             </a:fld>
             <a:endParaRPr lang="en-US"/>
           </a:p>
@@ -933,7 +936,7 @@
           <a:p>
             <a:fld id="{1A5CED13-31F0-4FC3-8F7A-2DEE65BE5627}" type="datetimeFigureOut">
               <a:rPr lang="en-US" smtClean="0"/>
-              <a:t>3/24/2017</a:t>
+              <a:t>3/29/2017</a:t>
             </a:fld>
             <a:endParaRPr lang="en-US"/>
           </a:p>
@@ -1113,7 +1116,7 @@
           <a:p>
             <a:fld id="{1A5CED13-31F0-4FC3-8F7A-2DEE65BE5627}" type="datetimeFigureOut">
               <a:rPr lang="en-US" smtClean="0"/>
-              <a:t>3/24/2017</a:t>
+              <a:t>3/29/2017</a:t>
             </a:fld>
             <a:endParaRPr lang="en-US"/>
           </a:p>
@@ -1283,7 +1286,7 @@
           <a:p>
             <a:fld id="{1A5CED13-31F0-4FC3-8F7A-2DEE65BE5627}" type="datetimeFigureOut">
               <a:rPr lang="en-US" smtClean="0"/>
-              <a:t>3/24/2017</a:t>
+              <a:t>3/29/2017</a:t>
             </a:fld>
             <a:endParaRPr lang="en-US"/>
           </a:p>
@@ -1529,7 +1532,7 @@
           <a:p>
             <a:fld id="{1A5CED13-31F0-4FC3-8F7A-2DEE65BE5627}" type="datetimeFigureOut">
               <a:rPr lang="en-US" smtClean="0"/>
-              <a:t>3/24/2017</a:t>
+              <a:t>3/29/2017</a:t>
             </a:fld>
             <a:endParaRPr lang="en-US"/>
           </a:p>
@@ -1817,7 +1820,7 @@
           <a:p>
             <a:fld id="{1A5CED13-31F0-4FC3-8F7A-2DEE65BE5627}" type="datetimeFigureOut">
               <a:rPr lang="en-US" smtClean="0"/>
-              <a:t>3/24/2017</a:t>
+              <a:t>3/29/2017</a:t>
             </a:fld>
             <a:endParaRPr lang="en-US"/>
           </a:p>
@@ -2239,7 +2242,7 @@
           <a:p>
             <a:fld id="{1A5CED13-31F0-4FC3-8F7A-2DEE65BE5627}" type="datetimeFigureOut">
               <a:rPr lang="en-US" smtClean="0"/>
-              <a:t>3/24/2017</a:t>
+              <a:t>3/29/2017</a:t>
             </a:fld>
             <a:endParaRPr lang="en-US"/>
           </a:p>
@@ -2357,7 +2360,7 @@
           <a:p>
             <a:fld id="{1A5CED13-31F0-4FC3-8F7A-2DEE65BE5627}" type="datetimeFigureOut">
               <a:rPr lang="en-US" smtClean="0"/>
-              <a:t>3/24/2017</a:t>
+              <a:t>3/29/2017</a:t>
             </a:fld>
             <a:endParaRPr lang="en-US"/>
           </a:p>
@@ -2452,7 +2455,7 @@
           <a:p>
             <a:fld id="{1A5CED13-31F0-4FC3-8F7A-2DEE65BE5627}" type="datetimeFigureOut">
               <a:rPr lang="en-US" smtClean="0"/>
-              <a:t>3/24/2017</a:t>
+              <a:t>3/29/2017</a:t>
             </a:fld>
             <a:endParaRPr lang="en-US"/>
           </a:p>
@@ -2729,7 +2732,7 @@
           <a:p>
             <a:fld id="{1A5CED13-31F0-4FC3-8F7A-2DEE65BE5627}" type="datetimeFigureOut">
               <a:rPr lang="en-US" smtClean="0"/>
-              <a:t>3/24/2017</a:t>
+              <a:t>3/29/2017</a:t>
             </a:fld>
             <a:endParaRPr lang="en-US"/>
           </a:p>
@@ -2982,7 +2985,7 @@
           <a:p>
             <a:fld id="{1A5CED13-31F0-4FC3-8F7A-2DEE65BE5627}" type="datetimeFigureOut">
               <a:rPr lang="en-US" smtClean="0"/>
-              <a:t>3/24/2017</a:t>
+              <a:t>3/29/2017</a:t>
             </a:fld>
             <a:endParaRPr lang="en-US"/>
           </a:p>
@@ -3195,7 +3198,7 @@
           <a:p>
             <a:fld id="{1A5CED13-31F0-4FC3-8F7A-2DEE65BE5627}" type="datetimeFigureOut">
               <a:rPr lang="en-US" smtClean="0"/>
-              <a:t>3/24/2017</a:t>
+              <a:t>3/29/2017</a:t>
             </a:fld>
             <a:endParaRPr lang="en-US"/>
           </a:p>
@@ -18670,8 +18673,8 @@
           </a:p>
         </p:txBody>
       </p:sp>
-      <mc:AlternateContent xmlns:mc="http://schemas.openxmlformats.org/markup-compatibility/2006">
-        <mc:Choice xmlns:a14="http://schemas.microsoft.com/office/drawing/2010/main" Requires="a14">
+      <mc:AlternateContent xmlns:mc="http://schemas.openxmlformats.org/markup-compatibility/2006" xmlns:a14="http://schemas.microsoft.com/office/drawing/2010/main">
+        <mc:Choice Requires="a14">
           <p:sp>
             <p:nvSpPr>
               <p:cNvPr id="4" name="Textfeld 3"/>
@@ -18694,6 +18697,7 @@
               </a:bodyPr>
               <a:lstStyle/>
               <a:p>
+                <a:pPr/>
                 <a14:m>
                   <m:oMathPara xmlns:m="http://schemas.openxmlformats.org/officeDocument/2006/math">
                     <m:oMathParaPr>
@@ -18733,7 +18737,7 @@
             </p:txBody>
           </p:sp>
         </mc:Choice>
-        <mc:Fallback>
+        <mc:Fallback xmlns="">
           <p:sp>
             <p:nvSpPr>
               <p:cNvPr id="4" name="Textfeld 3"/>
@@ -18772,8 +18776,8 @@
           </p:sp>
         </mc:Fallback>
       </mc:AlternateContent>
-      <mc:AlternateContent xmlns:mc="http://schemas.openxmlformats.org/markup-compatibility/2006">
-        <mc:Choice xmlns:a14="http://schemas.microsoft.com/office/drawing/2010/main" Requires="a14">
+      <mc:AlternateContent xmlns:mc="http://schemas.openxmlformats.org/markup-compatibility/2006" xmlns:a14="http://schemas.microsoft.com/office/drawing/2010/main">
+        <mc:Choice Requires="a14">
           <p:sp>
             <p:nvSpPr>
               <p:cNvPr id="5" name="Textfeld 4"/>
@@ -18796,6 +18800,7 @@
               </a:bodyPr>
               <a:lstStyle/>
               <a:p>
+                <a:pPr/>
                 <a14:m>
                   <m:oMathPara xmlns:m="http://schemas.openxmlformats.org/officeDocument/2006/math">
                     <m:oMathParaPr>
@@ -18847,7 +18852,7 @@
             </p:txBody>
           </p:sp>
         </mc:Choice>
-        <mc:Fallback>
+        <mc:Fallback xmlns="">
           <p:sp>
             <p:nvSpPr>
               <p:cNvPr id="5" name="Textfeld 4"/>
@@ -19756,8 +19761,8 @@
           </a:fontRef>
         </p:style>
       </p:cxnSp>
-      <mc:AlternateContent xmlns:mc="http://schemas.openxmlformats.org/markup-compatibility/2006">
-        <mc:Choice xmlns:a14="http://schemas.microsoft.com/office/drawing/2010/main" Requires="a14">
+      <mc:AlternateContent xmlns:mc="http://schemas.openxmlformats.org/markup-compatibility/2006" xmlns:a14="http://schemas.microsoft.com/office/drawing/2010/main">
+        <mc:Choice Requires="a14">
           <p:sp>
             <p:nvSpPr>
               <p:cNvPr id="5" name="Textfeld 4"/>
@@ -19801,7 +19806,7 @@
             </p:txBody>
           </p:sp>
         </mc:Choice>
-        <mc:Fallback>
+        <mc:Fallback xmlns="">
           <p:sp>
             <p:nvSpPr>
               <p:cNvPr id="5" name="Textfeld 4"/>
@@ -19840,8 +19845,8 @@
           </p:sp>
         </mc:Fallback>
       </mc:AlternateContent>
-      <mc:AlternateContent xmlns:mc="http://schemas.openxmlformats.org/markup-compatibility/2006">
-        <mc:Choice xmlns:a14="http://schemas.microsoft.com/office/drawing/2010/main" Requires="a14">
+      <mc:AlternateContent xmlns:mc="http://schemas.openxmlformats.org/markup-compatibility/2006" xmlns:a14="http://schemas.microsoft.com/office/drawing/2010/main">
+        <mc:Choice Requires="a14">
           <p:sp>
             <p:nvSpPr>
               <p:cNvPr id="6" name="Textfeld 5"/>
@@ -19885,7 +19890,7 @@
             </p:txBody>
           </p:sp>
         </mc:Choice>
-        <mc:Fallback>
+        <mc:Fallback xmlns="">
           <p:sp>
             <p:nvSpPr>
               <p:cNvPr id="6" name="Textfeld 5"/>
@@ -19924,8 +19929,8 @@
           </p:sp>
         </mc:Fallback>
       </mc:AlternateContent>
-      <mc:AlternateContent xmlns:mc="http://schemas.openxmlformats.org/markup-compatibility/2006">
-        <mc:Choice xmlns:a14="http://schemas.microsoft.com/office/drawing/2010/main" Requires="a14">
+      <mc:AlternateContent xmlns:mc="http://schemas.openxmlformats.org/markup-compatibility/2006" xmlns:a14="http://schemas.microsoft.com/office/drawing/2010/main">
+        <mc:Choice Requires="a14">
           <p:sp>
             <p:nvSpPr>
               <p:cNvPr id="7" name="Textfeld 6"/>
@@ -19988,7 +19993,7 @@
             </p:txBody>
           </p:sp>
         </mc:Choice>
-        <mc:Fallback>
+        <mc:Fallback xmlns="">
           <p:sp>
             <p:nvSpPr>
               <p:cNvPr id="7" name="Textfeld 6"/>
@@ -20136,8 +20141,8 @@
           </a:fontRef>
         </p:style>
       </p:cxnSp>
-      <mc:AlternateContent xmlns:mc="http://schemas.openxmlformats.org/markup-compatibility/2006">
-        <mc:Choice xmlns:a14="http://schemas.microsoft.com/office/drawing/2010/main" Requires="a14">
+      <mc:AlternateContent xmlns:mc="http://schemas.openxmlformats.org/markup-compatibility/2006" xmlns:a14="http://schemas.microsoft.com/office/drawing/2010/main">
+        <mc:Choice Requires="a14">
           <p:sp>
             <p:nvSpPr>
               <p:cNvPr id="18" name="Textfeld 17"/>
@@ -20181,7 +20186,7 @@
             </p:txBody>
           </p:sp>
         </mc:Choice>
-        <mc:Fallback>
+        <mc:Fallback xmlns="">
           <p:sp>
             <p:nvSpPr>
               <p:cNvPr id="18" name="Textfeld 17"/>
@@ -20220,8 +20225,8 @@
           </p:sp>
         </mc:Fallback>
       </mc:AlternateContent>
-      <mc:AlternateContent xmlns:mc="http://schemas.openxmlformats.org/markup-compatibility/2006">
-        <mc:Choice xmlns:a14="http://schemas.microsoft.com/office/drawing/2010/main" Requires="a14">
+      <mc:AlternateContent xmlns:mc="http://schemas.openxmlformats.org/markup-compatibility/2006" xmlns:a14="http://schemas.microsoft.com/office/drawing/2010/main">
+        <mc:Choice Requires="a14">
           <p:sp>
             <p:nvSpPr>
               <p:cNvPr id="19" name="Textfeld 18"/>
@@ -20265,7 +20270,7 @@
             </p:txBody>
           </p:sp>
         </mc:Choice>
-        <mc:Fallback>
+        <mc:Fallback xmlns="">
           <p:sp>
             <p:nvSpPr>
               <p:cNvPr id="19" name="Textfeld 18"/>
@@ -22097,8 +22102,8 @@
           </a:fontRef>
         </p:style>
       </p:cxnSp>
-      <mc:AlternateContent xmlns:mc="http://schemas.openxmlformats.org/markup-compatibility/2006">
-        <mc:Choice xmlns:a14="http://schemas.microsoft.com/office/drawing/2010/main" Requires="a14">
+      <mc:AlternateContent xmlns:mc="http://schemas.openxmlformats.org/markup-compatibility/2006" xmlns:a14="http://schemas.microsoft.com/office/drawing/2010/main">
+        <mc:Choice Requires="a14">
           <p:sp>
             <p:nvSpPr>
               <p:cNvPr id="7" name="Textfeld 6"/>
@@ -22145,7 +22150,7 @@
             </p:txBody>
           </p:sp>
         </mc:Choice>
-        <mc:Fallback>
+        <mc:Fallback xmlns="">
           <p:sp>
             <p:nvSpPr>
               <p:cNvPr id="7" name="Textfeld 6"/>
@@ -22184,8 +22189,8 @@
           </p:sp>
         </mc:Fallback>
       </mc:AlternateContent>
-      <mc:AlternateContent xmlns:mc="http://schemas.openxmlformats.org/markup-compatibility/2006">
-        <mc:Choice xmlns:a14="http://schemas.microsoft.com/office/drawing/2010/main" Requires="a14">
+      <mc:AlternateContent xmlns:mc="http://schemas.openxmlformats.org/markup-compatibility/2006" xmlns:a14="http://schemas.microsoft.com/office/drawing/2010/main">
+        <mc:Choice Requires="a14">
           <p:sp>
             <p:nvSpPr>
               <p:cNvPr id="8" name="Textfeld 7"/>
@@ -22229,7 +22234,7 @@
             </p:txBody>
           </p:sp>
         </mc:Choice>
-        <mc:Fallback>
+        <mc:Fallback xmlns="">
           <p:sp>
             <p:nvSpPr>
               <p:cNvPr id="8" name="Textfeld 7"/>
@@ -22268,8 +22273,8 @@
           </p:sp>
         </mc:Fallback>
       </mc:AlternateContent>
-      <mc:AlternateContent xmlns:mc="http://schemas.openxmlformats.org/markup-compatibility/2006">
-        <mc:Choice xmlns:a14="http://schemas.microsoft.com/office/drawing/2010/main" Requires="a14">
+      <mc:AlternateContent xmlns:mc="http://schemas.openxmlformats.org/markup-compatibility/2006" xmlns:a14="http://schemas.microsoft.com/office/drawing/2010/main">
+        <mc:Choice Requires="a14">
           <p:sp>
             <p:nvSpPr>
               <p:cNvPr id="9" name="Textfeld 8"/>
@@ -22332,7 +22337,7 @@
             </p:txBody>
           </p:sp>
         </mc:Choice>
-        <mc:Fallback>
+        <mc:Fallback xmlns="">
           <p:sp>
             <p:nvSpPr>
               <p:cNvPr id="9" name="Textfeld 8"/>
@@ -22443,8 +22448,8 @@
           </a:fontRef>
         </p:style>
       </p:cxnSp>
-      <mc:AlternateContent xmlns:mc="http://schemas.openxmlformats.org/markup-compatibility/2006">
-        <mc:Choice xmlns:a14="http://schemas.microsoft.com/office/drawing/2010/main" Requires="a14">
+      <mc:AlternateContent xmlns:mc="http://schemas.openxmlformats.org/markup-compatibility/2006" xmlns:a14="http://schemas.microsoft.com/office/drawing/2010/main">
+        <mc:Choice Requires="a14">
           <p:sp>
             <p:nvSpPr>
               <p:cNvPr id="13" name="Textfeld 12"/>
@@ -22488,7 +22493,7 @@
             </p:txBody>
           </p:sp>
         </mc:Choice>
-        <mc:Fallback>
+        <mc:Fallback xmlns="">
           <p:sp>
             <p:nvSpPr>
               <p:cNvPr id="13" name="Textfeld 12"/>
@@ -22527,8 +22532,8 @@
           </p:sp>
         </mc:Fallback>
       </mc:AlternateContent>
-      <mc:AlternateContent xmlns:mc="http://schemas.openxmlformats.org/markup-compatibility/2006">
-        <mc:Choice xmlns:a14="http://schemas.microsoft.com/office/drawing/2010/main" Requires="a14">
+      <mc:AlternateContent xmlns:mc="http://schemas.openxmlformats.org/markup-compatibility/2006" xmlns:a14="http://schemas.microsoft.com/office/drawing/2010/main">
+        <mc:Choice Requires="a14">
           <p:sp>
             <p:nvSpPr>
               <p:cNvPr id="14" name="Textfeld 13"/>
@@ -22572,7 +22577,7 @@
             </p:txBody>
           </p:sp>
         </mc:Choice>
-        <mc:Fallback>
+        <mc:Fallback xmlns="">
           <p:sp>
             <p:nvSpPr>
               <p:cNvPr id="14" name="Textfeld 13"/>
@@ -23838,8 +23843,8 @@
           </a:fontRef>
         </p:style>
       </p:cxnSp>
-      <mc:AlternateContent xmlns:mc="http://schemas.openxmlformats.org/markup-compatibility/2006">
-        <mc:Choice xmlns:a14="http://schemas.microsoft.com/office/drawing/2010/main" Requires="a14">
+      <mc:AlternateContent xmlns:mc="http://schemas.openxmlformats.org/markup-compatibility/2006" xmlns:a14="http://schemas.microsoft.com/office/drawing/2010/main">
+        <mc:Choice Requires="a14">
           <p:sp>
             <p:nvSpPr>
               <p:cNvPr id="5" name="Textfeld 4"/>
@@ -23883,7 +23888,7 @@
             </p:txBody>
           </p:sp>
         </mc:Choice>
-        <mc:Fallback>
+        <mc:Fallback xmlns="">
           <p:sp>
             <p:nvSpPr>
               <p:cNvPr id="5" name="Textfeld 4"/>
@@ -23922,8 +23927,8 @@
           </p:sp>
         </mc:Fallback>
       </mc:AlternateContent>
-      <mc:AlternateContent xmlns:mc="http://schemas.openxmlformats.org/markup-compatibility/2006">
-        <mc:Choice xmlns:a14="http://schemas.microsoft.com/office/drawing/2010/main" Requires="a14">
+      <mc:AlternateContent xmlns:mc="http://schemas.openxmlformats.org/markup-compatibility/2006" xmlns:a14="http://schemas.microsoft.com/office/drawing/2010/main">
+        <mc:Choice Requires="a14">
           <p:sp>
             <p:nvSpPr>
               <p:cNvPr id="7" name="Textfeld 6"/>
@@ -23967,7 +23972,7 @@
             </p:txBody>
           </p:sp>
         </mc:Choice>
-        <mc:Fallback>
+        <mc:Fallback xmlns="">
           <p:sp>
             <p:nvSpPr>
               <p:cNvPr id="7" name="Textfeld 6"/>
@@ -24672,8 +24677,8 @@
           </a:fontRef>
         </p:style>
       </p:cxnSp>
-      <mc:AlternateContent xmlns:mc="http://schemas.openxmlformats.org/markup-compatibility/2006">
-        <mc:Choice xmlns:a14="http://schemas.microsoft.com/office/drawing/2010/main" Requires="a14">
+      <mc:AlternateContent xmlns:mc="http://schemas.openxmlformats.org/markup-compatibility/2006" xmlns:a14="http://schemas.microsoft.com/office/drawing/2010/main">
+        <mc:Choice Requires="a14">
           <p:sp>
             <p:nvSpPr>
               <p:cNvPr id="3" name="Textfeld 2"/>
@@ -24736,7 +24741,7 @@
             </p:txBody>
           </p:sp>
         </mc:Choice>
-        <mc:Fallback>
+        <mc:Fallback xmlns="">
           <p:sp>
             <p:nvSpPr>
               <p:cNvPr id="3" name="Textfeld 2"/>
@@ -25485,8 +25490,8 @@
           </a:fontRef>
         </p:style>
       </p:cxnSp>
-      <mc:AlternateContent xmlns:mc="http://schemas.openxmlformats.org/markup-compatibility/2006">
-        <mc:Choice xmlns:a14="http://schemas.microsoft.com/office/drawing/2010/main" Requires="a14">
+      <mc:AlternateContent xmlns:mc="http://schemas.openxmlformats.org/markup-compatibility/2006" xmlns:a14="http://schemas.microsoft.com/office/drawing/2010/main">
+        <mc:Choice Requires="a14">
           <p:sp>
             <p:nvSpPr>
               <p:cNvPr id="20" name="Textfeld 19"/>
@@ -25530,7 +25535,7 @@
             </p:txBody>
           </p:sp>
         </mc:Choice>
-        <mc:Fallback>
+        <mc:Fallback xmlns="">
           <p:sp>
             <p:nvSpPr>
               <p:cNvPr id="20" name="Textfeld 19"/>
@@ -25569,8 +25574,8 @@
           </p:sp>
         </mc:Fallback>
       </mc:AlternateContent>
-      <mc:AlternateContent xmlns:mc="http://schemas.openxmlformats.org/markup-compatibility/2006">
-        <mc:Choice xmlns:a14="http://schemas.microsoft.com/office/drawing/2010/main" Requires="a14">
+      <mc:AlternateContent xmlns:mc="http://schemas.openxmlformats.org/markup-compatibility/2006" xmlns:a14="http://schemas.microsoft.com/office/drawing/2010/main">
+        <mc:Choice Requires="a14">
           <p:sp>
             <p:nvSpPr>
               <p:cNvPr id="21" name="Textfeld 20"/>
@@ -25614,7 +25619,7 @@
             </p:txBody>
           </p:sp>
         </mc:Choice>
-        <mc:Fallback>
+        <mc:Fallback xmlns="">
           <p:sp>
             <p:nvSpPr>
               <p:cNvPr id="21" name="Textfeld 20"/>
@@ -26222,8 +26227,8 @@
           </a:fontRef>
         </p:style>
       </p:cxnSp>
-      <mc:AlternateContent xmlns:mc="http://schemas.openxmlformats.org/markup-compatibility/2006">
-        <mc:Choice xmlns:a14="http://schemas.microsoft.com/office/drawing/2010/main" Requires="a14">
+      <mc:AlternateContent xmlns:mc="http://schemas.openxmlformats.org/markup-compatibility/2006" xmlns:a14="http://schemas.microsoft.com/office/drawing/2010/main">
+        <mc:Choice Requires="a14">
           <p:sp>
             <p:nvSpPr>
               <p:cNvPr id="36" name="Textfeld 35"/>
@@ -26286,7 +26291,7 @@
             </p:txBody>
           </p:sp>
         </mc:Choice>
-        <mc:Fallback>
+        <mc:Fallback xmlns="">
           <p:sp>
             <p:nvSpPr>
               <p:cNvPr id="36" name="Textfeld 35"/>
@@ -26473,8 +26478,8 @@
           </a:fontRef>
         </p:style>
       </p:cxnSp>
-      <mc:AlternateContent xmlns:mc="http://schemas.openxmlformats.org/markup-compatibility/2006">
-        <mc:Choice xmlns:a14="http://schemas.microsoft.com/office/drawing/2010/main" Requires="a14">
+      <mc:AlternateContent xmlns:mc="http://schemas.openxmlformats.org/markup-compatibility/2006" xmlns:a14="http://schemas.microsoft.com/office/drawing/2010/main">
+        <mc:Choice Requires="a14">
           <p:sp>
             <p:nvSpPr>
               <p:cNvPr id="84" name="Textfeld 83"/>
@@ -26497,6 +26502,7 @@
               </a:bodyPr>
               <a:lstStyle/>
               <a:p>
+                <a:pPr/>
                 <a14:m>
                   <m:oMathPara xmlns:m="http://schemas.openxmlformats.org/officeDocument/2006/math">
                     <m:oMathParaPr>
@@ -26518,7 +26524,7 @@
             </p:txBody>
           </p:sp>
         </mc:Choice>
-        <mc:Fallback>
+        <mc:Fallback xmlns="">
           <p:sp>
             <p:nvSpPr>
               <p:cNvPr id="84" name="Textfeld 83"/>
@@ -26623,8 +26629,8 @@
           </a:fontRef>
         </p:style>
       </p:cxnSp>
-      <mc:AlternateContent xmlns:mc="http://schemas.openxmlformats.org/markup-compatibility/2006">
-        <mc:Choice xmlns:a14="http://schemas.microsoft.com/office/drawing/2010/main" Requires="a14">
+      <mc:AlternateContent xmlns:mc="http://schemas.openxmlformats.org/markup-compatibility/2006" xmlns:a14="http://schemas.microsoft.com/office/drawing/2010/main">
+        <mc:Choice Requires="a14">
           <p:sp>
             <p:nvSpPr>
               <p:cNvPr id="4" name="Textfeld 3"/>
@@ -26699,7 +26705,7 @@
             </p:txBody>
           </p:sp>
         </mc:Choice>
-        <mc:Fallback>
+        <mc:Fallback xmlns="">
           <p:sp>
             <p:nvSpPr>
               <p:cNvPr id="4" name="Textfeld 3"/>
@@ -27014,8 +27020,8 @@
           </a:p>
         </p:txBody>
       </p:sp>
-      <mc:AlternateContent xmlns:mc="http://schemas.openxmlformats.org/markup-compatibility/2006">
-        <mc:Choice xmlns:a14="http://schemas.microsoft.com/office/drawing/2010/main" Requires="a14">
+      <mc:AlternateContent xmlns:mc="http://schemas.openxmlformats.org/markup-compatibility/2006" xmlns:a14="http://schemas.microsoft.com/office/drawing/2010/main">
+        <mc:Choice Requires="a14">
           <p:sp>
             <p:nvSpPr>
               <p:cNvPr id="12" name="Textfeld 11"/>
@@ -27059,7 +27065,7 @@
             </p:txBody>
           </p:sp>
         </mc:Choice>
-        <mc:Fallback>
+        <mc:Fallback xmlns="">
           <p:sp>
             <p:nvSpPr>
               <p:cNvPr id="12" name="Textfeld 11"/>
@@ -27254,8 +27260,8 @@
           </a:fontRef>
         </p:style>
       </p:cxnSp>
-      <mc:AlternateContent xmlns:mc="http://schemas.openxmlformats.org/markup-compatibility/2006">
-        <mc:Choice xmlns:a14="http://schemas.microsoft.com/office/drawing/2010/main" Requires="a14">
+      <mc:AlternateContent xmlns:mc="http://schemas.openxmlformats.org/markup-compatibility/2006" xmlns:a14="http://schemas.microsoft.com/office/drawing/2010/main">
+        <mc:Choice Requires="a14">
           <p:sp>
             <p:nvSpPr>
               <p:cNvPr id="16" name="Textfeld 15"/>
@@ -27299,7 +27305,7 @@
             </p:txBody>
           </p:sp>
         </mc:Choice>
-        <mc:Fallback>
+        <mc:Fallback xmlns="">
           <p:sp>
             <p:nvSpPr>
               <p:cNvPr id="16" name="Textfeld 15"/>
@@ -27440,8 +27446,8 @@
           </a:fontRef>
         </p:style>
       </p:cxnSp>
-      <mc:AlternateContent xmlns:mc="http://schemas.openxmlformats.org/markup-compatibility/2006">
-        <mc:Choice xmlns:a14="http://schemas.microsoft.com/office/drawing/2010/main" Requires="a14">
+      <mc:AlternateContent xmlns:mc="http://schemas.openxmlformats.org/markup-compatibility/2006" xmlns:a14="http://schemas.microsoft.com/office/drawing/2010/main">
+        <mc:Choice Requires="a14">
           <p:sp>
             <p:nvSpPr>
               <p:cNvPr id="4" name="Textfeld 3"/>
@@ -27485,7 +27491,7 @@
             </p:txBody>
           </p:sp>
         </mc:Choice>
-        <mc:Fallback>
+        <mc:Fallback xmlns="">
           <p:sp>
             <p:nvSpPr>
               <p:cNvPr id="4" name="Textfeld 3"/>
@@ -27524,8 +27530,8 @@
           </p:sp>
         </mc:Fallback>
       </mc:AlternateContent>
-      <mc:AlternateContent xmlns:mc="http://schemas.openxmlformats.org/markup-compatibility/2006">
-        <mc:Choice xmlns:a14="http://schemas.microsoft.com/office/drawing/2010/main" Requires="a14">
+      <mc:AlternateContent xmlns:mc="http://schemas.openxmlformats.org/markup-compatibility/2006" xmlns:a14="http://schemas.microsoft.com/office/drawing/2010/main">
+        <mc:Choice Requires="a14">
           <p:sp>
             <p:nvSpPr>
               <p:cNvPr id="5" name="Textfeld 4"/>
@@ -27569,7 +27575,7 @@
             </p:txBody>
           </p:sp>
         </mc:Choice>
-        <mc:Fallback>
+        <mc:Fallback xmlns="">
           <p:sp>
             <p:nvSpPr>
               <p:cNvPr id="5" name="Textfeld 4"/>
@@ -27608,8 +27614,8 @@
           </p:sp>
         </mc:Fallback>
       </mc:AlternateContent>
-      <mc:AlternateContent xmlns:mc="http://schemas.openxmlformats.org/markup-compatibility/2006">
-        <mc:Choice xmlns:a14="http://schemas.microsoft.com/office/drawing/2010/main" Requires="a14">
+      <mc:AlternateContent xmlns:mc="http://schemas.openxmlformats.org/markup-compatibility/2006" xmlns:a14="http://schemas.microsoft.com/office/drawing/2010/main">
+        <mc:Choice Requires="a14">
           <p:sp>
             <p:nvSpPr>
               <p:cNvPr id="6" name="Textfeld 5"/>
@@ -27672,7 +27678,7 @@
             </p:txBody>
           </p:sp>
         </mc:Choice>
-        <mc:Fallback>
+        <mc:Fallback xmlns="">
           <p:sp>
             <p:nvSpPr>
               <p:cNvPr id="6" name="Textfeld 5"/>
@@ -27744,8 +27750,8 @@
           </a:fontRef>
         </p:style>
       </p:cxnSp>
-      <mc:AlternateContent xmlns:mc="http://schemas.openxmlformats.org/markup-compatibility/2006">
-        <mc:Choice xmlns:a14="http://schemas.microsoft.com/office/drawing/2010/main" Requires="a14">
+      <mc:AlternateContent xmlns:mc="http://schemas.openxmlformats.org/markup-compatibility/2006" xmlns:a14="http://schemas.microsoft.com/office/drawing/2010/main">
+        <mc:Choice Requires="a14">
           <p:sp>
             <p:nvSpPr>
               <p:cNvPr id="11" name="Textfeld 10"/>
@@ -27837,7 +27843,7 @@
             </p:txBody>
           </p:sp>
         </mc:Choice>
-        <mc:Fallback>
+        <mc:Fallback xmlns="">
           <p:sp>
             <p:nvSpPr>
               <p:cNvPr id="11" name="Textfeld 10"/>
@@ -28166,8 +28172,8 @@
           </a:p>
         </p:txBody>
       </p:sp>
-      <mc:AlternateContent xmlns:mc="http://schemas.openxmlformats.org/markup-compatibility/2006">
-        <mc:Choice xmlns:a14="http://schemas.microsoft.com/office/drawing/2010/main" Requires="a14">
+      <mc:AlternateContent xmlns:mc="http://schemas.openxmlformats.org/markup-compatibility/2006" xmlns:a14="http://schemas.microsoft.com/office/drawing/2010/main">
+        <mc:Choice Requires="a14">
           <p:sp>
             <p:nvSpPr>
               <p:cNvPr id="4" name="Textfeld 3"/>
@@ -28190,6 +28196,7 @@
               </a:bodyPr>
               <a:lstStyle/>
               <a:p>
+                <a:pPr/>
                 <a14:m>
                   <m:oMathPara xmlns:m="http://schemas.openxmlformats.org/officeDocument/2006/math">
                     <m:oMathParaPr>
@@ -28246,7 +28253,7 @@
             </p:txBody>
           </p:sp>
         </mc:Choice>
-        <mc:Fallback>
+        <mc:Fallback xmlns="">
           <p:sp>
             <p:nvSpPr>
               <p:cNvPr id="4" name="Textfeld 3"/>
@@ -28285,8 +28292,8 @@
           </p:sp>
         </mc:Fallback>
       </mc:AlternateContent>
-      <mc:AlternateContent xmlns:mc="http://schemas.openxmlformats.org/markup-compatibility/2006">
-        <mc:Choice xmlns:a14="http://schemas.microsoft.com/office/drawing/2010/main" Requires="a14">
+      <mc:AlternateContent xmlns:mc="http://schemas.openxmlformats.org/markup-compatibility/2006" xmlns:a14="http://schemas.microsoft.com/office/drawing/2010/main">
+        <mc:Choice Requires="a14">
           <p:sp>
             <p:nvSpPr>
               <p:cNvPr id="5" name="Textfeld 4"/>
@@ -28309,6 +28316,7 @@
               </a:bodyPr>
               <a:lstStyle/>
               <a:p>
+                <a:pPr/>
                 <a14:m>
                   <m:oMathPara xmlns:m="http://schemas.openxmlformats.org/officeDocument/2006/math">
                     <m:oMathParaPr>
@@ -28365,7 +28373,7 @@
             </p:txBody>
           </p:sp>
         </mc:Choice>
-        <mc:Fallback>
+        <mc:Fallback xmlns="">
           <p:sp>
             <p:nvSpPr>
               <p:cNvPr id="5" name="Textfeld 4"/>
@@ -31968,6 +31976,3949 @@
       </p:par>
     </p:tnLst>
   </p:timing>
+</p:sld>
+</file>
+
+<file path=ppt/slides/slide40.xml><?xml version="1.0" encoding="utf-8"?>
+<p:sld xmlns:a="http://schemas.openxmlformats.org/drawingml/2006/main" xmlns:r="http://schemas.openxmlformats.org/officeDocument/2006/relationships" xmlns:p="http://schemas.openxmlformats.org/presentationml/2006/main">
+  <p:cSld>
+    <p:spTree>
+      <p:nvGrpSpPr>
+        <p:cNvPr id="1" name=""/>
+        <p:cNvGrpSpPr/>
+        <p:nvPr/>
+      </p:nvGrpSpPr>
+      <p:grpSpPr>
+        <a:xfrm>
+          <a:off x="0" y="0"/>
+          <a:ext cx="0" cy="0"/>
+          <a:chOff x="0" y="0"/>
+          <a:chExt cx="0" cy="0"/>
+        </a:xfrm>
+      </p:grpSpPr>
+      <p:cxnSp>
+        <p:nvCxnSpPr>
+          <p:cNvPr id="5" name="Gerade Verbindung mit Pfeil 4"/>
+          <p:cNvCxnSpPr/>
+          <p:nvPr/>
+        </p:nvCxnSpPr>
+        <p:spPr>
+          <a:xfrm flipV="1">
+            <a:off x="1146546" y="840847"/>
+            <a:ext cx="1" cy="2305842"/>
+          </a:xfrm>
+          <a:prstGeom prst="straightConnector1">
+            <a:avLst/>
+          </a:prstGeom>
+          <a:ln w="76200">
+            <a:solidFill>
+              <a:schemeClr val="tx1"/>
+            </a:solidFill>
+            <a:tailEnd type="arrow"/>
+          </a:ln>
+        </p:spPr>
+        <p:style>
+          <a:lnRef idx="1">
+            <a:schemeClr val="accent1"/>
+          </a:lnRef>
+          <a:fillRef idx="0">
+            <a:schemeClr val="accent1"/>
+          </a:fillRef>
+          <a:effectRef idx="0">
+            <a:schemeClr val="accent1"/>
+          </a:effectRef>
+          <a:fontRef idx="minor">
+            <a:schemeClr val="tx1"/>
+          </a:fontRef>
+        </p:style>
+      </p:cxnSp>
+      <p:cxnSp>
+        <p:nvCxnSpPr>
+          <p:cNvPr id="6" name="Gerade Verbindung mit Pfeil 5"/>
+          <p:cNvCxnSpPr/>
+          <p:nvPr/>
+        </p:nvCxnSpPr>
+        <p:spPr>
+          <a:xfrm>
+            <a:off x="1146546" y="3146689"/>
+            <a:ext cx="5324420" cy="0"/>
+          </a:xfrm>
+          <a:prstGeom prst="straightConnector1">
+            <a:avLst/>
+          </a:prstGeom>
+          <a:ln w="76200">
+            <a:solidFill>
+              <a:schemeClr val="tx1"/>
+            </a:solidFill>
+            <a:tailEnd type="arrow"/>
+          </a:ln>
+        </p:spPr>
+        <p:style>
+          <a:lnRef idx="1">
+            <a:schemeClr val="accent1"/>
+          </a:lnRef>
+          <a:fillRef idx="0">
+            <a:schemeClr val="accent1"/>
+          </a:fillRef>
+          <a:effectRef idx="0">
+            <a:schemeClr val="accent1"/>
+          </a:effectRef>
+          <a:fontRef idx="minor">
+            <a:schemeClr val="tx1"/>
+          </a:fontRef>
+        </p:style>
+      </p:cxnSp>
+      <mc:AlternateContent xmlns:mc="http://schemas.openxmlformats.org/markup-compatibility/2006">
+        <mc:Choice xmlns:a14="http://schemas.microsoft.com/office/drawing/2010/main" Requires="a14">
+          <p:sp>
+            <p:nvSpPr>
+              <p:cNvPr id="7" name="Textfeld 6"/>
+              <p:cNvSpPr txBox="1"/>
+              <p:nvPr/>
+            </p:nvSpPr>
+            <p:spPr>
+              <a:xfrm>
+                <a:off x="815591" y="71405"/>
+                <a:ext cx="807593" cy="769441"/>
+              </a:xfrm>
+              <a:prstGeom prst="rect">
+                <a:avLst/>
+              </a:prstGeom>
+              <a:noFill/>
+            </p:spPr>
+            <p:txBody>
+              <a:bodyPr wrap="none" rtlCol="0">
+                <a:spAutoFit/>
+              </a:bodyPr>
+              <a:lstStyle/>
+              <a:p>
+                <a:pPr/>
+                <a14:m>
+                  <m:oMathPara xmlns:m="http://schemas.openxmlformats.org/officeDocument/2006/math">
+                    <m:oMathParaPr>
+                      <m:jc m:val="centerGroup"/>
+                    </m:oMathParaPr>
+                    <m:oMath xmlns:m="http://schemas.openxmlformats.org/officeDocument/2006/math">
+                      <m:r>
+                        <a:rPr lang="de-DE" sz="4400" b="0" i="1" smtClean="0">
+                          <a:latin typeface="Cambria Math"/>
+                        </a:rPr>
+                        <m:t>𝑀</m:t>
+                      </m:r>
+                    </m:oMath>
+                  </m:oMathPara>
+                </a14:m>
+                <a:endParaRPr lang="de-DE" sz="4400" b="0" dirty="0" smtClean="0"/>
+              </a:p>
+            </p:txBody>
+          </p:sp>
+        </mc:Choice>
+        <mc:Fallback>
+          <p:sp>
+            <p:nvSpPr>
+              <p:cNvPr id="7" name="Textfeld 6"/>
+              <p:cNvSpPr txBox="1">
+                <a:spLocks noRot="1" noChangeAspect="1" noMove="1" noResize="1" noEditPoints="1" noAdjustHandles="1" noChangeArrowheads="1" noChangeShapeType="1" noTextEdit="1"/>
+              </p:cNvSpPr>
+              <p:nvPr/>
+            </p:nvSpPr>
+            <p:spPr>
+              <a:xfrm>
+                <a:off x="815591" y="71405"/>
+                <a:ext cx="807593" cy="769441"/>
+              </a:xfrm>
+              <a:prstGeom prst="rect">
+                <a:avLst/>
+              </a:prstGeom>
+              <a:blipFill rotWithShape="1">
+                <a:blip r:embed="rId2"/>
+                <a:stretch>
+                  <a:fillRect/>
+                </a:stretch>
+              </a:blipFill>
+            </p:spPr>
+            <p:txBody>
+              <a:bodyPr/>
+              <a:lstStyle/>
+              <a:p>
+                <a:r>
+                  <a:rPr lang="en-US">
+                    <a:noFill/>
+                  </a:rPr>
+                  <a:t> </a:t>
+                </a:r>
+              </a:p>
+            </p:txBody>
+          </p:sp>
+        </mc:Fallback>
+      </mc:AlternateContent>
+      <mc:AlternateContent xmlns:mc="http://schemas.openxmlformats.org/markup-compatibility/2006">
+        <mc:Choice xmlns:a14="http://schemas.microsoft.com/office/drawing/2010/main" Requires="a14">
+          <p:sp>
+            <p:nvSpPr>
+              <p:cNvPr id="8" name="Textfeld 7"/>
+              <p:cNvSpPr txBox="1"/>
+              <p:nvPr/>
+            </p:nvSpPr>
+            <p:spPr>
+              <a:xfrm>
+                <a:off x="6470966" y="2838813"/>
+                <a:ext cx="661912" cy="769441"/>
+              </a:xfrm>
+              <a:prstGeom prst="rect">
+                <a:avLst/>
+              </a:prstGeom>
+              <a:noFill/>
+            </p:spPr>
+            <p:txBody>
+              <a:bodyPr wrap="none" rtlCol="0">
+                <a:spAutoFit/>
+              </a:bodyPr>
+              <a:lstStyle/>
+              <a:p>
+                <a:pPr/>
+                <a14:m>
+                  <m:oMathPara xmlns:m="http://schemas.openxmlformats.org/officeDocument/2006/math">
+                    <m:oMathParaPr>
+                      <m:jc m:val="centerGroup"/>
+                    </m:oMathParaPr>
+                    <m:oMath xmlns:m="http://schemas.openxmlformats.org/officeDocument/2006/math">
+                      <m:r>
+                        <a:rPr lang="de-DE" sz="4400" b="0" i="1" smtClean="0">
+                          <a:latin typeface="Cambria Math"/>
+                        </a:rPr>
+                        <m:t>𝑇</m:t>
+                      </m:r>
+                    </m:oMath>
+                  </m:oMathPara>
+                </a14:m>
+                <a:endParaRPr lang="en-US" sz="4400" dirty="0"/>
+              </a:p>
+            </p:txBody>
+          </p:sp>
+        </mc:Choice>
+        <mc:Fallback>
+          <p:sp>
+            <p:nvSpPr>
+              <p:cNvPr id="8" name="Textfeld 7"/>
+              <p:cNvSpPr txBox="1">
+                <a:spLocks noRot="1" noChangeAspect="1" noMove="1" noResize="1" noEditPoints="1" noAdjustHandles="1" noChangeArrowheads="1" noChangeShapeType="1" noTextEdit="1"/>
+              </p:cNvSpPr>
+              <p:nvPr/>
+            </p:nvSpPr>
+            <p:spPr>
+              <a:xfrm>
+                <a:off x="6470966" y="2838813"/>
+                <a:ext cx="661912" cy="769441"/>
+              </a:xfrm>
+              <a:prstGeom prst="rect">
+                <a:avLst/>
+              </a:prstGeom>
+              <a:blipFill rotWithShape="1">
+                <a:blip r:embed="rId3"/>
+                <a:stretch>
+                  <a:fillRect/>
+                </a:stretch>
+              </a:blipFill>
+            </p:spPr>
+            <p:txBody>
+              <a:bodyPr/>
+              <a:lstStyle/>
+              <a:p>
+                <a:r>
+                  <a:rPr lang="en-US">
+                    <a:noFill/>
+                  </a:rPr>
+                  <a:t> </a:t>
+                </a:r>
+              </a:p>
+            </p:txBody>
+          </p:sp>
+        </mc:Fallback>
+      </mc:AlternateContent>
+      <p:cxnSp>
+        <p:nvCxnSpPr>
+          <p:cNvPr id="11" name="Gerade Verbindung mit Pfeil 10"/>
+          <p:cNvCxnSpPr/>
+          <p:nvPr/>
+        </p:nvCxnSpPr>
+        <p:spPr>
+          <a:xfrm>
+            <a:off x="1160611" y="6338540"/>
+            <a:ext cx="5324420" cy="0"/>
+          </a:xfrm>
+          <a:prstGeom prst="straightConnector1">
+            <a:avLst/>
+          </a:prstGeom>
+          <a:ln w="76200">
+            <a:solidFill>
+              <a:schemeClr val="tx1"/>
+            </a:solidFill>
+            <a:tailEnd type="arrow"/>
+          </a:ln>
+        </p:spPr>
+        <p:style>
+          <a:lnRef idx="1">
+            <a:schemeClr val="accent1"/>
+          </a:lnRef>
+          <a:fillRef idx="0">
+            <a:schemeClr val="accent1"/>
+          </a:fillRef>
+          <a:effectRef idx="0">
+            <a:schemeClr val="accent1"/>
+          </a:effectRef>
+          <a:fontRef idx="minor">
+            <a:schemeClr val="tx1"/>
+          </a:fontRef>
+        </p:style>
+      </p:cxnSp>
+      <mc:AlternateContent xmlns:mc="http://schemas.openxmlformats.org/markup-compatibility/2006">
+        <mc:Choice xmlns:a14="http://schemas.microsoft.com/office/drawing/2010/main" Requires="a14">
+          <p:sp>
+            <p:nvSpPr>
+              <p:cNvPr id="12" name="Textfeld 11"/>
+              <p:cNvSpPr txBox="1"/>
+              <p:nvPr/>
+            </p:nvSpPr>
+            <p:spPr>
+              <a:xfrm>
+                <a:off x="6823751" y="5272374"/>
+                <a:ext cx="895053" cy="1343894"/>
+              </a:xfrm>
+              <a:prstGeom prst="rect">
+                <a:avLst/>
+              </a:prstGeom>
+              <a:noFill/>
+            </p:spPr>
+            <p:txBody>
+              <a:bodyPr wrap="none" rtlCol="0">
+                <a:spAutoFit/>
+              </a:bodyPr>
+              <a:lstStyle/>
+              <a:p>
+                <a:pPr/>
+                <a14:m>
+                  <m:oMath xmlns:m="http://schemas.openxmlformats.org/officeDocument/2006/math">
+                    <m:f>
+                      <m:fPr>
+                        <m:ctrlPr>
+                          <a:rPr lang="de-DE" sz="4800" b="0" i="1" smtClean="0">
+                            <a:latin typeface="Cambria Math"/>
+                          </a:rPr>
+                        </m:ctrlPr>
+                      </m:fPr>
+                      <m:num>
+                        <m:r>
+                          <a:rPr lang="de-DE" sz="4800" b="0" i="1" smtClean="0">
+                            <a:latin typeface="Cambria Math"/>
+                          </a:rPr>
+                          <m:t>𝜖</m:t>
+                        </m:r>
+                      </m:num>
+                      <m:den>
+                        <m:sSup>
+                          <m:sSupPr>
+                            <m:ctrlPr>
+                              <a:rPr lang="de-DE" sz="4800" i="1">
+                                <a:latin typeface="Cambria Math"/>
+                              </a:rPr>
+                            </m:ctrlPr>
+                          </m:sSupPr>
+                          <m:e>
+                            <m:r>
+                              <a:rPr lang="de-DE" sz="4800" i="1">
+                                <a:latin typeface="Cambria Math"/>
+                              </a:rPr>
+                              <m:t>𝐵</m:t>
+                            </m:r>
+                          </m:e>
+                          <m:sup>
+                            <m:f>
+                              <m:fPr>
+                                <m:ctrlPr>
+                                  <a:rPr lang="de-DE" sz="4800" i="1">
+                                    <a:latin typeface="Cambria Math"/>
+                                  </a:rPr>
+                                </m:ctrlPr>
+                              </m:fPr>
+                              <m:num>
+                                <m:r>
+                                  <a:rPr lang="de-DE" sz="4800" i="1">
+                                    <a:latin typeface="Cambria Math"/>
+                                  </a:rPr>
+                                  <m:t>1</m:t>
+                                </m:r>
+                              </m:num>
+                              <m:den>
+                                <m:r>
+                                  <a:rPr lang="de-DE" sz="4800" i="1">
+                                    <a:latin typeface="Cambria Math"/>
+                                  </a:rPr>
+                                  <m:t>𝛿</m:t>
+                                </m:r>
+                              </m:den>
+                            </m:f>
+                          </m:sup>
+                        </m:sSup>
+                      </m:den>
+                    </m:f>
+                  </m:oMath>
+                </a14:m>
+                <a:r>
+                  <a:rPr lang="en-US" sz="4800" dirty="0" smtClean="0"/>
+                  <a:t> </a:t>
+                </a:r>
+                <a:endParaRPr lang="en-US" sz="4800" dirty="0"/>
+              </a:p>
+            </p:txBody>
+          </p:sp>
+        </mc:Choice>
+        <mc:Fallback>
+          <p:sp>
+            <p:nvSpPr>
+              <p:cNvPr id="12" name="Textfeld 11"/>
+              <p:cNvSpPr txBox="1">
+                <a:spLocks noRot="1" noChangeAspect="1" noMove="1" noResize="1" noEditPoints="1" noAdjustHandles="1" noChangeArrowheads="1" noChangeShapeType="1" noTextEdit="1"/>
+              </p:cNvSpPr>
+              <p:nvPr/>
+            </p:nvSpPr>
+            <p:spPr>
+              <a:xfrm>
+                <a:off x="6823751" y="5272374"/>
+                <a:ext cx="895053" cy="1343894"/>
+              </a:xfrm>
+              <a:prstGeom prst="rect">
+                <a:avLst/>
+              </a:prstGeom>
+              <a:blipFill rotWithShape="1">
+                <a:blip r:embed="rId4"/>
+                <a:stretch>
+                  <a:fillRect/>
+                </a:stretch>
+              </a:blipFill>
+            </p:spPr>
+            <p:txBody>
+              <a:bodyPr/>
+              <a:lstStyle/>
+              <a:p>
+                <a:r>
+                  <a:rPr lang="en-US">
+                    <a:noFill/>
+                  </a:rPr>
+                  <a:t> </a:t>
+                </a:r>
+              </a:p>
+            </p:txBody>
+          </p:sp>
+        </mc:Fallback>
+      </mc:AlternateContent>
+      <p:sp>
+        <p:nvSpPr>
+          <p:cNvPr id="16" name="Freihandform 15"/>
+          <p:cNvSpPr/>
+          <p:nvPr/>
+        </p:nvSpPr>
+        <p:spPr>
+          <a:xfrm>
+            <a:off x="1111846" y="1522321"/>
+            <a:ext cx="5114468" cy="1600200"/>
+          </a:xfrm>
+          <a:custGeom>
+            <a:avLst/>
+            <a:gdLst>
+              <a:gd name="connsiteX0" fmla="*/ 0 w 4686300"/>
+              <a:gd name="connsiteY0" fmla="*/ 0 h 1468966"/>
+              <a:gd name="connsiteX1" fmla="*/ 1047750 w 4686300"/>
+              <a:gd name="connsiteY1" fmla="*/ 19050 h 1468966"/>
+              <a:gd name="connsiteX2" fmla="*/ 1943100 w 4686300"/>
+              <a:gd name="connsiteY2" fmla="*/ 228600 h 1468966"/>
+              <a:gd name="connsiteX3" fmla="*/ 2533650 w 4686300"/>
+              <a:gd name="connsiteY3" fmla="*/ 609600 h 1468966"/>
+              <a:gd name="connsiteX4" fmla="*/ 3086100 w 4686300"/>
+              <a:gd name="connsiteY4" fmla="*/ 1085850 h 1468966"/>
+              <a:gd name="connsiteX5" fmla="*/ 3390900 w 4686300"/>
+              <a:gd name="connsiteY5" fmla="*/ 1314450 h 1468966"/>
+              <a:gd name="connsiteX6" fmla="*/ 3848100 w 4686300"/>
+              <a:gd name="connsiteY6" fmla="*/ 1447800 h 1468966"/>
+              <a:gd name="connsiteX7" fmla="*/ 4686300 w 4686300"/>
+              <a:gd name="connsiteY7" fmla="*/ 1466850 h 1468966"/>
+            </a:gdLst>
+            <a:ahLst/>
+            <a:cxnLst>
+              <a:cxn ang="0">
+                <a:pos x="connsiteX0" y="connsiteY0"/>
+              </a:cxn>
+              <a:cxn ang="0">
+                <a:pos x="connsiteX1" y="connsiteY1"/>
+              </a:cxn>
+              <a:cxn ang="0">
+                <a:pos x="connsiteX2" y="connsiteY2"/>
+              </a:cxn>
+              <a:cxn ang="0">
+                <a:pos x="connsiteX3" y="connsiteY3"/>
+              </a:cxn>
+              <a:cxn ang="0">
+                <a:pos x="connsiteX4" y="connsiteY4"/>
+              </a:cxn>
+              <a:cxn ang="0">
+                <a:pos x="connsiteX5" y="connsiteY5"/>
+              </a:cxn>
+              <a:cxn ang="0">
+                <a:pos x="connsiteX6" y="connsiteY6"/>
+              </a:cxn>
+              <a:cxn ang="0">
+                <a:pos x="connsiteX7" y="connsiteY7"/>
+              </a:cxn>
+            </a:cxnLst>
+            <a:rect l="l" t="t" r="r" b="b"/>
+            <a:pathLst>
+              <a:path w="4686300" h="1468966">
+                <a:moveTo>
+                  <a:pt x="0" y="0"/>
+                </a:moveTo>
+                <a:lnTo>
+                  <a:pt x="1047750" y="19050"/>
+                </a:lnTo>
+                <a:cubicBezTo>
+                  <a:pt x="1371600" y="57150"/>
+                  <a:pt x="1695450" y="130175"/>
+                  <a:pt x="1943100" y="228600"/>
+                </a:cubicBezTo>
+                <a:cubicBezTo>
+                  <a:pt x="2190750" y="327025"/>
+                  <a:pt x="2343150" y="466725"/>
+                  <a:pt x="2533650" y="609600"/>
+                </a:cubicBezTo>
+                <a:cubicBezTo>
+                  <a:pt x="2724150" y="752475"/>
+                  <a:pt x="2943225" y="968375"/>
+                  <a:pt x="3086100" y="1085850"/>
+                </a:cubicBezTo>
+                <a:cubicBezTo>
+                  <a:pt x="3228975" y="1203325"/>
+                  <a:pt x="3263900" y="1254125"/>
+                  <a:pt x="3390900" y="1314450"/>
+                </a:cubicBezTo>
+                <a:cubicBezTo>
+                  <a:pt x="3517900" y="1374775"/>
+                  <a:pt x="3632200" y="1422400"/>
+                  <a:pt x="3848100" y="1447800"/>
+                </a:cubicBezTo>
+                <a:cubicBezTo>
+                  <a:pt x="4064000" y="1473200"/>
+                  <a:pt x="4375150" y="1470025"/>
+                  <a:pt x="4686300" y="1466850"/>
+                </a:cubicBezTo>
+              </a:path>
+            </a:pathLst>
+          </a:custGeom>
+          <a:noFill/>
+          <a:ln w="76200">
+            <a:solidFill>
+              <a:schemeClr val="accent1">
+                <a:lumMod val="60000"/>
+                <a:lumOff val="40000"/>
+              </a:schemeClr>
+            </a:solidFill>
+          </a:ln>
+        </p:spPr>
+        <p:style>
+          <a:lnRef idx="2">
+            <a:schemeClr val="accent1">
+              <a:shade val="50000"/>
+            </a:schemeClr>
+          </a:lnRef>
+          <a:fillRef idx="1">
+            <a:schemeClr val="accent1"/>
+          </a:fillRef>
+          <a:effectRef idx="0">
+            <a:schemeClr val="accent1"/>
+          </a:effectRef>
+          <a:fontRef idx="minor">
+            <a:schemeClr val="lt1"/>
+          </a:fontRef>
+        </p:style>
+        <p:txBody>
+          <a:bodyPr rtlCol="0" anchor="ctr"/>
+          <a:lstStyle/>
+          <a:p>
+            <a:pPr algn="ctr"/>
+            <a:endParaRPr lang="en-US"/>
+          </a:p>
+        </p:txBody>
+      </p:sp>
+      <p:sp>
+        <p:nvSpPr>
+          <p:cNvPr id="17" name="Freihandform 16"/>
+          <p:cNvSpPr/>
+          <p:nvPr/>
+        </p:nvSpPr>
+        <p:spPr>
+          <a:xfrm>
+            <a:off x="1193555" y="1560421"/>
+            <a:ext cx="4366009" cy="1562100"/>
+          </a:xfrm>
+          <a:custGeom>
+            <a:avLst/>
+            <a:gdLst>
+              <a:gd name="connsiteX0" fmla="*/ 0 w 4000500"/>
+              <a:gd name="connsiteY0" fmla="*/ 0 h 1562100"/>
+              <a:gd name="connsiteX1" fmla="*/ 838200 w 4000500"/>
+              <a:gd name="connsiteY1" fmla="*/ 19050 h 1562100"/>
+              <a:gd name="connsiteX2" fmla="*/ 1162050 w 4000500"/>
+              <a:gd name="connsiteY2" fmla="*/ 171450 h 1562100"/>
+              <a:gd name="connsiteX3" fmla="*/ 1428750 w 4000500"/>
+              <a:gd name="connsiteY3" fmla="*/ 800100 h 1562100"/>
+              <a:gd name="connsiteX4" fmla="*/ 1638300 w 4000500"/>
+              <a:gd name="connsiteY4" fmla="*/ 1371600 h 1562100"/>
+              <a:gd name="connsiteX5" fmla="*/ 1847850 w 4000500"/>
+              <a:gd name="connsiteY5" fmla="*/ 1504950 h 1562100"/>
+              <a:gd name="connsiteX6" fmla="*/ 2457450 w 4000500"/>
+              <a:gd name="connsiteY6" fmla="*/ 1543050 h 1562100"/>
+              <a:gd name="connsiteX7" fmla="*/ 4000500 w 4000500"/>
+              <a:gd name="connsiteY7" fmla="*/ 1562100 h 1562100"/>
+            </a:gdLst>
+            <a:ahLst/>
+            <a:cxnLst>
+              <a:cxn ang="0">
+                <a:pos x="connsiteX0" y="connsiteY0"/>
+              </a:cxn>
+              <a:cxn ang="0">
+                <a:pos x="connsiteX1" y="connsiteY1"/>
+              </a:cxn>
+              <a:cxn ang="0">
+                <a:pos x="connsiteX2" y="connsiteY2"/>
+              </a:cxn>
+              <a:cxn ang="0">
+                <a:pos x="connsiteX3" y="connsiteY3"/>
+              </a:cxn>
+              <a:cxn ang="0">
+                <a:pos x="connsiteX4" y="connsiteY4"/>
+              </a:cxn>
+              <a:cxn ang="0">
+                <a:pos x="connsiteX5" y="connsiteY5"/>
+              </a:cxn>
+              <a:cxn ang="0">
+                <a:pos x="connsiteX6" y="connsiteY6"/>
+              </a:cxn>
+              <a:cxn ang="0">
+                <a:pos x="connsiteX7" y="connsiteY7"/>
+              </a:cxn>
+            </a:cxnLst>
+            <a:rect l="l" t="t" r="r" b="b"/>
+            <a:pathLst>
+              <a:path w="4000500" h="1562100">
+                <a:moveTo>
+                  <a:pt x="0" y="0"/>
+                </a:moveTo>
+                <a:lnTo>
+                  <a:pt x="838200" y="19050"/>
+                </a:lnTo>
+                <a:cubicBezTo>
+                  <a:pt x="1031875" y="47625"/>
+                  <a:pt x="1063625" y="41275"/>
+                  <a:pt x="1162050" y="171450"/>
+                </a:cubicBezTo>
+                <a:cubicBezTo>
+                  <a:pt x="1260475" y="301625"/>
+                  <a:pt x="1349375" y="600075"/>
+                  <a:pt x="1428750" y="800100"/>
+                </a:cubicBezTo>
+                <a:cubicBezTo>
+                  <a:pt x="1508125" y="1000125"/>
+                  <a:pt x="1568450" y="1254125"/>
+                  <a:pt x="1638300" y="1371600"/>
+                </a:cubicBezTo>
+                <a:cubicBezTo>
+                  <a:pt x="1708150" y="1489075"/>
+                  <a:pt x="1711325" y="1476375"/>
+                  <a:pt x="1847850" y="1504950"/>
+                </a:cubicBezTo>
+                <a:cubicBezTo>
+                  <a:pt x="1984375" y="1533525"/>
+                  <a:pt x="2098675" y="1533525"/>
+                  <a:pt x="2457450" y="1543050"/>
+                </a:cubicBezTo>
+                <a:cubicBezTo>
+                  <a:pt x="2816225" y="1552575"/>
+                  <a:pt x="3408362" y="1557337"/>
+                  <a:pt x="4000500" y="1562100"/>
+                </a:cubicBezTo>
+              </a:path>
+            </a:pathLst>
+          </a:custGeom>
+          <a:noFill/>
+          <a:ln w="76200">
+            <a:solidFill>
+              <a:schemeClr val="accent1">
+                <a:lumMod val="50000"/>
+              </a:schemeClr>
+            </a:solidFill>
+          </a:ln>
+        </p:spPr>
+        <p:style>
+          <a:lnRef idx="2">
+            <a:schemeClr val="accent1">
+              <a:shade val="50000"/>
+            </a:schemeClr>
+          </a:lnRef>
+          <a:fillRef idx="1">
+            <a:schemeClr val="accent1"/>
+          </a:fillRef>
+          <a:effectRef idx="0">
+            <a:schemeClr val="accent1"/>
+          </a:effectRef>
+          <a:fontRef idx="minor">
+            <a:schemeClr val="lt1"/>
+          </a:fontRef>
+        </p:style>
+        <p:txBody>
+          <a:bodyPr rtlCol="0" anchor="ctr"/>
+          <a:lstStyle/>
+          <a:p>
+            <a:pPr algn="ctr"/>
+            <a:endParaRPr lang="en-US"/>
+          </a:p>
+        </p:txBody>
+      </p:sp>
+      <p:sp>
+        <p:nvSpPr>
+          <p:cNvPr id="15" name="Freihandform 14"/>
+          <p:cNvSpPr/>
+          <p:nvPr/>
+        </p:nvSpPr>
+        <p:spPr>
+          <a:xfrm>
+            <a:off x="1145108" y="1541371"/>
+            <a:ext cx="4262056" cy="1562100"/>
+          </a:xfrm>
+          <a:custGeom>
+            <a:avLst/>
+            <a:gdLst>
+              <a:gd name="connsiteX0" fmla="*/ 0 w 3905250"/>
+              <a:gd name="connsiteY0" fmla="*/ 0 h 1562100"/>
+              <a:gd name="connsiteX1" fmla="*/ 590550 w 3905250"/>
+              <a:gd name="connsiteY1" fmla="*/ 19050 h 1562100"/>
+              <a:gd name="connsiteX2" fmla="*/ 1123950 w 3905250"/>
+              <a:gd name="connsiteY2" fmla="*/ 76200 h 1562100"/>
+              <a:gd name="connsiteX3" fmla="*/ 1543050 w 3905250"/>
+              <a:gd name="connsiteY3" fmla="*/ 495300 h 1562100"/>
+              <a:gd name="connsiteX4" fmla="*/ 2209800 w 3905250"/>
+              <a:gd name="connsiteY4" fmla="*/ 1276350 h 1562100"/>
+              <a:gd name="connsiteX5" fmla="*/ 2762250 w 3905250"/>
+              <a:gd name="connsiteY5" fmla="*/ 1504950 h 1562100"/>
+              <a:gd name="connsiteX6" fmla="*/ 3905250 w 3905250"/>
+              <a:gd name="connsiteY6" fmla="*/ 1562100 h 1562100"/>
+            </a:gdLst>
+            <a:ahLst/>
+            <a:cxnLst>
+              <a:cxn ang="0">
+                <a:pos x="connsiteX0" y="connsiteY0"/>
+              </a:cxn>
+              <a:cxn ang="0">
+                <a:pos x="connsiteX1" y="connsiteY1"/>
+              </a:cxn>
+              <a:cxn ang="0">
+                <a:pos x="connsiteX2" y="connsiteY2"/>
+              </a:cxn>
+              <a:cxn ang="0">
+                <a:pos x="connsiteX3" y="connsiteY3"/>
+              </a:cxn>
+              <a:cxn ang="0">
+                <a:pos x="connsiteX4" y="connsiteY4"/>
+              </a:cxn>
+              <a:cxn ang="0">
+                <a:pos x="connsiteX5" y="connsiteY5"/>
+              </a:cxn>
+              <a:cxn ang="0">
+                <a:pos x="connsiteX6" y="connsiteY6"/>
+              </a:cxn>
+            </a:cxnLst>
+            <a:rect l="l" t="t" r="r" b="b"/>
+            <a:pathLst>
+              <a:path w="3905250" h="1562100">
+                <a:moveTo>
+                  <a:pt x="0" y="0"/>
+                </a:moveTo>
+                <a:cubicBezTo>
+                  <a:pt x="201612" y="3175"/>
+                  <a:pt x="403225" y="6350"/>
+                  <a:pt x="590550" y="19050"/>
+                </a:cubicBezTo>
+                <a:cubicBezTo>
+                  <a:pt x="777875" y="31750"/>
+                  <a:pt x="965200" y="-3175"/>
+                  <a:pt x="1123950" y="76200"/>
+                </a:cubicBezTo>
+                <a:cubicBezTo>
+                  <a:pt x="1282700" y="155575"/>
+                  <a:pt x="1362075" y="295275"/>
+                  <a:pt x="1543050" y="495300"/>
+                </a:cubicBezTo>
+                <a:cubicBezTo>
+                  <a:pt x="1724025" y="695325"/>
+                  <a:pt x="2006600" y="1108075"/>
+                  <a:pt x="2209800" y="1276350"/>
+                </a:cubicBezTo>
+                <a:cubicBezTo>
+                  <a:pt x="2413000" y="1444625"/>
+                  <a:pt x="2479675" y="1457325"/>
+                  <a:pt x="2762250" y="1504950"/>
+                </a:cubicBezTo>
+                <a:cubicBezTo>
+                  <a:pt x="3044825" y="1552575"/>
+                  <a:pt x="3475037" y="1557337"/>
+                  <a:pt x="3905250" y="1562100"/>
+                </a:cubicBezTo>
+              </a:path>
+            </a:pathLst>
+          </a:custGeom>
+          <a:noFill/>
+          <a:ln w="76200"/>
+        </p:spPr>
+        <p:style>
+          <a:lnRef idx="2">
+            <a:schemeClr val="accent1">
+              <a:shade val="50000"/>
+            </a:schemeClr>
+          </a:lnRef>
+          <a:fillRef idx="1">
+            <a:schemeClr val="accent1"/>
+          </a:fillRef>
+          <a:effectRef idx="0">
+            <a:schemeClr val="accent1"/>
+          </a:effectRef>
+          <a:fontRef idx="minor">
+            <a:schemeClr val="lt1"/>
+          </a:fontRef>
+        </p:style>
+        <p:txBody>
+          <a:bodyPr rtlCol="0" anchor="ctr"/>
+          <a:lstStyle/>
+          <a:p>
+            <a:pPr algn="ctr"/>
+            <a:endParaRPr lang="en-US"/>
+          </a:p>
+        </p:txBody>
+      </p:sp>
+      <p:sp>
+        <p:nvSpPr>
+          <p:cNvPr id="19" name="Textfeld 18"/>
+          <p:cNvSpPr txBox="1"/>
+          <p:nvPr/>
+        </p:nvSpPr>
+        <p:spPr>
+          <a:xfrm>
+            <a:off x="6485031" y="1224327"/>
+            <a:ext cx="2036135" cy="769441"/>
+          </a:xfrm>
+          <a:prstGeom prst="rect">
+            <a:avLst/>
+          </a:prstGeom>
+          <a:noFill/>
+        </p:spPr>
+        <p:txBody>
+          <a:bodyPr wrap="none" rtlCol="0">
+            <a:spAutoFit/>
+          </a:bodyPr>
+          <a:lstStyle/>
+          <a:p>
+            <a:r>
+              <a:rPr lang="de-DE" sz="4400" b="1" dirty="0" smtClean="0">
+                <a:latin typeface="CMU Serif" panose="02000603000000000000" pitchFamily="2" charset="0"/>
+                <a:ea typeface="CMU Serif" panose="02000603000000000000" pitchFamily="2" charset="0"/>
+                <a:cs typeface="CMU Serif" panose="02000603000000000000" pitchFamily="2" charset="0"/>
+              </a:rPr>
+              <a:t>vorher</a:t>
+            </a:r>
+            <a:endParaRPr lang="en-US" sz="4400" b="1" dirty="0">
+              <a:latin typeface="CMU Serif" panose="02000603000000000000" pitchFamily="2" charset="0"/>
+              <a:ea typeface="CMU Serif" panose="02000603000000000000" pitchFamily="2" charset="0"/>
+              <a:cs typeface="CMU Serif" panose="02000603000000000000" pitchFamily="2" charset="0"/>
+            </a:endParaRPr>
+          </a:p>
+        </p:txBody>
+      </p:sp>
+      <p:sp>
+        <p:nvSpPr>
+          <p:cNvPr id="20" name="Textfeld 19"/>
+          <p:cNvSpPr txBox="1"/>
+          <p:nvPr/>
+        </p:nvSpPr>
+        <p:spPr>
+          <a:xfrm>
+            <a:off x="6289464" y="4630479"/>
+            <a:ext cx="2427268" cy="769441"/>
+          </a:xfrm>
+          <a:prstGeom prst="rect">
+            <a:avLst/>
+          </a:prstGeom>
+          <a:noFill/>
+        </p:spPr>
+        <p:txBody>
+          <a:bodyPr wrap="none" rtlCol="0">
+            <a:spAutoFit/>
+          </a:bodyPr>
+          <a:lstStyle/>
+          <a:p>
+            <a:r>
+              <a:rPr lang="de-DE" sz="4400" b="1" dirty="0" smtClean="0">
+                <a:latin typeface="CMU Serif" panose="02000603000000000000" pitchFamily="2" charset="0"/>
+                <a:ea typeface="CMU Serif" panose="02000603000000000000" pitchFamily="2" charset="0"/>
+                <a:cs typeface="CMU Serif" panose="02000603000000000000" pitchFamily="2" charset="0"/>
+              </a:rPr>
+              <a:t>nachher</a:t>
+            </a:r>
+            <a:endParaRPr lang="en-US" sz="4400" b="1" dirty="0">
+              <a:latin typeface="CMU Serif" panose="02000603000000000000" pitchFamily="2" charset="0"/>
+              <a:ea typeface="CMU Serif" panose="02000603000000000000" pitchFamily="2" charset="0"/>
+              <a:cs typeface="CMU Serif" panose="02000603000000000000" pitchFamily="2" charset="0"/>
+            </a:endParaRPr>
+          </a:p>
+        </p:txBody>
+      </p:sp>
+      <p:sp>
+        <p:nvSpPr>
+          <p:cNvPr id="23" name="Freihandform 22"/>
+          <p:cNvSpPr/>
+          <p:nvPr/>
+        </p:nvSpPr>
+        <p:spPr>
+          <a:xfrm>
+            <a:off x="438093" y="4572508"/>
+            <a:ext cx="4956276" cy="1720493"/>
+          </a:xfrm>
+          <a:custGeom>
+            <a:avLst/>
+            <a:gdLst>
+              <a:gd name="connsiteX0" fmla="*/ 0 w 4686300"/>
+              <a:gd name="connsiteY0" fmla="*/ 0 h 1468966"/>
+              <a:gd name="connsiteX1" fmla="*/ 1047750 w 4686300"/>
+              <a:gd name="connsiteY1" fmla="*/ 19050 h 1468966"/>
+              <a:gd name="connsiteX2" fmla="*/ 1943100 w 4686300"/>
+              <a:gd name="connsiteY2" fmla="*/ 228600 h 1468966"/>
+              <a:gd name="connsiteX3" fmla="*/ 2533650 w 4686300"/>
+              <a:gd name="connsiteY3" fmla="*/ 609600 h 1468966"/>
+              <a:gd name="connsiteX4" fmla="*/ 3086100 w 4686300"/>
+              <a:gd name="connsiteY4" fmla="*/ 1085850 h 1468966"/>
+              <a:gd name="connsiteX5" fmla="*/ 3390900 w 4686300"/>
+              <a:gd name="connsiteY5" fmla="*/ 1314450 h 1468966"/>
+              <a:gd name="connsiteX6" fmla="*/ 3848100 w 4686300"/>
+              <a:gd name="connsiteY6" fmla="*/ 1447800 h 1468966"/>
+              <a:gd name="connsiteX7" fmla="*/ 4686300 w 4686300"/>
+              <a:gd name="connsiteY7" fmla="*/ 1466850 h 1468966"/>
+            </a:gdLst>
+            <a:ahLst/>
+            <a:cxnLst>
+              <a:cxn ang="0">
+                <a:pos x="connsiteX0" y="connsiteY0"/>
+              </a:cxn>
+              <a:cxn ang="0">
+                <a:pos x="connsiteX1" y="connsiteY1"/>
+              </a:cxn>
+              <a:cxn ang="0">
+                <a:pos x="connsiteX2" y="connsiteY2"/>
+              </a:cxn>
+              <a:cxn ang="0">
+                <a:pos x="connsiteX3" y="connsiteY3"/>
+              </a:cxn>
+              <a:cxn ang="0">
+                <a:pos x="connsiteX4" y="connsiteY4"/>
+              </a:cxn>
+              <a:cxn ang="0">
+                <a:pos x="connsiteX5" y="connsiteY5"/>
+              </a:cxn>
+              <a:cxn ang="0">
+                <a:pos x="connsiteX6" y="connsiteY6"/>
+              </a:cxn>
+              <a:cxn ang="0">
+                <a:pos x="connsiteX7" y="connsiteY7"/>
+              </a:cxn>
+            </a:cxnLst>
+            <a:rect l="l" t="t" r="r" b="b"/>
+            <a:pathLst>
+              <a:path w="4686300" h="1468966">
+                <a:moveTo>
+                  <a:pt x="0" y="0"/>
+                </a:moveTo>
+                <a:lnTo>
+                  <a:pt x="1047750" y="19050"/>
+                </a:lnTo>
+                <a:cubicBezTo>
+                  <a:pt x="1371600" y="57150"/>
+                  <a:pt x="1695450" y="130175"/>
+                  <a:pt x="1943100" y="228600"/>
+                </a:cubicBezTo>
+                <a:cubicBezTo>
+                  <a:pt x="2190750" y="327025"/>
+                  <a:pt x="2343150" y="466725"/>
+                  <a:pt x="2533650" y="609600"/>
+                </a:cubicBezTo>
+                <a:cubicBezTo>
+                  <a:pt x="2724150" y="752475"/>
+                  <a:pt x="2943225" y="968375"/>
+                  <a:pt x="3086100" y="1085850"/>
+                </a:cubicBezTo>
+                <a:cubicBezTo>
+                  <a:pt x="3228975" y="1203325"/>
+                  <a:pt x="3263900" y="1254125"/>
+                  <a:pt x="3390900" y="1314450"/>
+                </a:cubicBezTo>
+                <a:cubicBezTo>
+                  <a:pt x="3517900" y="1374775"/>
+                  <a:pt x="3632200" y="1422400"/>
+                  <a:pt x="3848100" y="1447800"/>
+                </a:cubicBezTo>
+                <a:cubicBezTo>
+                  <a:pt x="4064000" y="1473200"/>
+                  <a:pt x="4375150" y="1470025"/>
+                  <a:pt x="4686300" y="1466850"/>
+                </a:cubicBezTo>
+              </a:path>
+            </a:pathLst>
+          </a:custGeom>
+          <a:noFill/>
+          <a:ln w="76200">
+            <a:solidFill>
+              <a:schemeClr val="accent1">
+                <a:lumMod val="60000"/>
+                <a:lumOff val="40000"/>
+              </a:schemeClr>
+            </a:solidFill>
+          </a:ln>
+        </p:spPr>
+        <p:style>
+          <a:lnRef idx="2">
+            <a:schemeClr val="accent1">
+              <a:shade val="50000"/>
+            </a:schemeClr>
+          </a:lnRef>
+          <a:fillRef idx="1">
+            <a:schemeClr val="accent1"/>
+          </a:fillRef>
+          <a:effectRef idx="0">
+            <a:schemeClr val="accent1"/>
+          </a:effectRef>
+          <a:fontRef idx="minor">
+            <a:schemeClr val="lt1"/>
+          </a:fontRef>
+        </p:style>
+        <p:txBody>
+          <a:bodyPr rtlCol="0" anchor="ctr"/>
+          <a:lstStyle/>
+          <a:p>
+            <a:pPr algn="ctr"/>
+            <a:endParaRPr lang="en-US"/>
+          </a:p>
+        </p:txBody>
+      </p:sp>
+      <p:sp>
+        <p:nvSpPr>
+          <p:cNvPr id="24" name="Freihandform 23"/>
+          <p:cNvSpPr/>
+          <p:nvPr/>
+        </p:nvSpPr>
+        <p:spPr>
+          <a:xfrm>
+            <a:off x="437030" y="4891998"/>
+            <a:ext cx="5124072" cy="1210056"/>
+          </a:xfrm>
+          <a:custGeom>
+            <a:avLst/>
+            <a:gdLst>
+              <a:gd name="connsiteX0" fmla="*/ 0 w 4844955"/>
+              <a:gd name="connsiteY0" fmla="*/ 1174 h 1210056"/>
+              <a:gd name="connsiteX1" fmla="*/ 1378424 w 4844955"/>
+              <a:gd name="connsiteY1" fmla="*/ 28469 h 1210056"/>
+              <a:gd name="connsiteX2" fmla="*/ 2169994 w 4844955"/>
+              <a:gd name="connsiteY2" fmla="*/ 192242 h 1210056"/>
+              <a:gd name="connsiteX3" fmla="*/ 2688609 w 4844955"/>
+              <a:gd name="connsiteY3" fmla="*/ 533436 h 1210056"/>
+              <a:gd name="connsiteX4" fmla="*/ 3343702 w 4844955"/>
+              <a:gd name="connsiteY4" fmla="*/ 1120290 h 1210056"/>
+              <a:gd name="connsiteX5" fmla="*/ 4189863 w 4844955"/>
+              <a:gd name="connsiteY5" fmla="*/ 1202177 h 1210056"/>
+              <a:gd name="connsiteX6" fmla="*/ 4844955 w 4844955"/>
+              <a:gd name="connsiteY6" fmla="*/ 1202177 h 1210056"/>
+            </a:gdLst>
+            <a:ahLst/>
+            <a:cxnLst>
+              <a:cxn ang="0">
+                <a:pos x="connsiteX0" y="connsiteY0"/>
+              </a:cxn>
+              <a:cxn ang="0">
+                <a:pos x="connsiteX1" y="connsiteY1"/>
+              </a:cxn>
+              <a:cxn ang="0">
+                <a:pos x="connsiteX2" y="connsiteY2"/>
+              </a:cxn>
+              <a:cxn ang="0">
+                <a:pos x="connsiteX3" y="connsiteY3"/>
+              </a:cxn>
+              <a:cxn ang="0">
+                <a:pos x="connsiteX4" y="connsiteY4"/>
+              </a:cxn>
+              <a:cxn ang="0">
+                <a:pos x="connsiteX5" y="connsiteY5"/>
+              </a:cxn>
+              <a:cxn ang="0">
+                <a:pos x="connsiteX6" y="connsiteY6"/>
+              </a:cxn>
+            </a:cxnLst>
+            <a:rect l="l" t="t" r="r" b="b"/>
+            <a:pathLst>
+              <a:path w="4844955" h="1210056">
+                <a:moveTo>
+                  <a:pt x="0" y="1174"/>
+                </a:moveTo>
+                <a:cubicBezTo>
+                  <a:pt x="508379" y="-1101"/>
+                  <a:pt x="1016758" y="-3376"/>
+                  <a:pt x="1378424" y="28469"/>
+                </a:cubicBezTo>
+                <a:cubicBezTo>
+                  <a:pt x="1740090" y="60314"/>
+                  <a:pt x="1951630" y="108081"/>
+                  <a:pt x="2169994" y="192242"/>
+                </a:cubicBezTo>
+                <a:cubicBezTo>
+                  <a:pt x="2388358" y="276403"/>
+                  <a:pt x="2492991" y="378761"/>
+                  <a:pt x="2688609" y="533436"/>
+                </a:cubicBezTo>
+                <a:cubicBezTo>
+                  <a:pt x="2884227" y="688111"/>
+                  <a:pt x="3093493" y="1008833"/>
+                  <a:pt x="3343702" y="1120290"/>
+                </a:cubicBezTo>
+                <a:cubicBezTo>
+                  <a:pt x="3593911" y="1231747"/>
+                  <a:pt x="3939654" y="1188529"/>
+                  <a:pt x="4189863" y="1202177"/>
+                </a:cubicBezTo>
+                <a:cubicBezTo>
+                  <a:pt x="4440072" y="1215825"/>
+                  <a:pt x="4642513" y="1209001"/>
+                  <a:pt x="4844955" y="1202177"/>
+                </a:cubicBezTo>
+              </a:path>
+            </a:pathLst>
+          </a:custGeom>
+          <a:noFill/>
+          <a:ln w="76200"/>
+        </p:spPr>
+        <p:style>
+          <a:lnRef idx="2">
+            <a:schemeClr val="accent1">
+              <a:shade val="50000"/>
+            </a:schemeClr>
+          </a:lnRef>
+          <a:fillRef idx="1">
+            <a:schemeClr val="accent1"/>
+          </a:fillRef>
+          <a:effectRef idx="0">
+            <a:schemeClr val="accent1"/>
+          </a:effectRef>
+          <a:fontRef idx="minor">
+            <a:schemeClr val="lt1"/>
+          </a:fontRef>
+        </p:style>
+        <p:txBody>
+          <a:bodyPr rtlCol="0" anchor="ctr"/>
+          <a:lstStyle/>
+          <a:p>
+            <a:pPr algn="ctr"/>
+            <a:endParaRPr lang="en-US"/>
+          </a:p>
+        </p:txBody>
+      </p:sp>
+      <p:sp>
+        <p:nvSpPr>
+          <p:cNvPr id="25" name="Freihandform 24"/>
+          <p:cNvSpPr/>
+          <p:nvPr/>
+        </p:nvSpPr>
+        <p:spPr>
+          <a:xfrm>
+            <a:off x="476955" y="5208642"/>
+            <a:ext cx="4893128" cy="667845"/>
+          </a:xfrm>
+          <a:custGeom>
+            <a:avLst/>
+            <a:gdLst>
+              <a:gd name="connsiteX0" fmla="*/ 0 w 4626591"/>
+              <a:gd name="connsiteY0" fmla="*/ 3561 h 667845"/>
+              <a:gd name="connsiteX1" fmla="*/ 2074460 w 4626591"/>
+              <a:gd name="connsiteY1" fmla="*/ 44504 h 667845"/>
+              <a:gd name="connsiteX2" fmla="*/ 2743200 w 4626591"/>
+              <a:gd name="connsiteY2" fmla="*/ 317459 h 667845"/>
+              <a:gd name="connsiteX3" fmla="*/ 3029803 w 4626591"/>
+              <a:gd name="connsiteY3" fmla="*/ 563119 h 667845"/>
+              <a:gd name="connsiteX4" fmla="*/ 3398293 w 4626591"/>
+              <a:gd name="connsiteY4" fmla="*/ 658653 h 667845"/>
+              <a:gd name="connsiteX5" fmla="*/ 4626591 w 4626591"/>
+              <a:gd name="connsiteY5" fmla="*/ 658653 h 667845"/>
+            </a:gdLst>
+            <a:ahLst/>
+            <a:cxnLst>
+              <a:cxn ang="0">
+                <a:pos x="connsiteX0" y="connsiteY0"/>
+              </a:cxn>
+              <a:cxn ang="0">
+                <a:pos x="connsiteX1" y="connsiteY1"/>
+              </a:cxn>
+              <a:cxn ang="0">
+                <a:pos x="connsiteX2" y="connsiteY2"/>
+              </a:cxn>
+              <a:cxn ang="0">
+                <a:pos x="connsiteX3" y="connsiteY3"/>
+              </a:cxn>
+              <a:cxn ang="0">
+                <a:pos x="connsiteX4" y="connsiteY4"/>
+              </a:cxn>
+              <a:cxn ang="0">
+                <a:pos x="connsiteX5" y="connsiteY5"/>
+              </a:cxn>
+            </a:cxnLst>
+            <a:rect l="l" t="t" r="r" b="b"/>
+            <a:pathLst>
+              <a:path w="4626591" h="667845">
+                <a:moveTo>
+                  <a:pt x="0" y="3561"/>
+                </a:moveTo>
+                <a:cubicBezTo>
+                  <a:pt x="808630" y="-2126"/>
+                  <a:pt x="1617260" y="-7812"/>
+                  <a:pt x="2074460" y="44504"/>
+                </a:cubicBezTo>
+                <a:cubicBezTo>
+                  <a:pt x="2531660" y="96820"/>
+                  <a:pt x="2583976" y="231023"/>
+                  <a:pt x="2743200" y="317459"/>
+                </a:cubicBezTo>
+                <a:cubicBezTo>
+                  <a:pt x="2902424" y="403895"/>
+                  <a:pt x="2920621" y="506253"/>
+                  <a:pt x="3029803" y="563119"/>
+                </a:cubicBezTo>
+                <a:cubicBezTo>
+                  <a:pt x="3138985" y="619985"/>
+                  <a:pt x="3132162" y="642731"/>
+                  <a:pt x="3398293" y="658653"/>
+                </a:cubicBezTo>
+                <a:cubicBezTo>
+                  <a:pt x="3664424" y="674575"/>
+                  <a:pt x="4145507" y="666614"/>
+                  <a:pt x="4626591" y="658653"/>
+                </a:cubicBezTo>
+              </a:path>
+            </a:pathLst>
+          </a:custGeom>
+          <a:noFill/>
+          <a:ln w="76200">
+            <a:solidFill>
+              <a:schemeClr val="accent1">
+                <a:lumMod val="50000"/>
+              </a:schemeClr>
+            </a:solidFill>
+          </a:ln>
+        </p:spPr>
+        <p:style>
+          <a:lnRef idx="2">
+            <a:schemeClr val="accent1">
+              <a:shade val="50000"/>
+            </a:schemeClr>
+          </a:lnRef>
+          <a:fillRef idx="1">
+            <a:schemeClr val="accent1"/>
+          </a:fillRef>
+          <a:effectRef idx="0">
+            <a:schemeClr val="accent1"/>
+          </a:effectRef>
+          <a:fontRef idx="minor">
+            <a:schemeClr val="lt1"/>
+          </a:fontRef>
+        </p:style>
+        <p:txBody>
+          <a:bodyPr rtlCol="0" anchor="ctr"/>
+          <a:lstStyle/>
+          <a:p>
+            <a:pPr algn="ctr"/>
+            <a:endParaRPr lang="en-US"/>
+          </a:p>
+        </p:txBody>
+      </p:sp>
+      <p:cxnSp>
+        <p:nvCxnSpPr>
+          <p:cNvPr id="27" name="Gerade Verbindung 26"/>
+          <p:cNvCxnSpPr/>
+          <p:nvPr/>
+        </p:nvCxnSpPr>
+        <p:spPr>
+          <a:xfrm>
+            <a:off x="2555776" y="1224327"/>
+            <a:ext cx="0" cy="1922362"/>
+          </a:xfrm>
+          <a:prstGeom prst="line">
+            <a:avLst/>
+          </a:prstGeom>
+          <a:ln w="57150">
+            <a:solidFill>
+              <a:schemeClr val="bg1">
+                <a:lumMod val="50000"/>
+              </a:schemeClr>
+            </a:solidFill>
+            <a:prstDash val="sysDot"/>
+          </a:ln>
+        </p:spPr>
+        <p:style>
+          <a:lnRef idx="1">
+            <a:schemeClr val="accent1"/>
+          </a:lnRef>
+          <a:fillRef idx="0">
+            <a:schemeClr val="accent1"/>
+          </a:fillRef>
+          <a:effectRef idx="0">
+            <a:schemeClr val="accent1"/>
+          </a:effectRef>
+          <a:fontRef idx="minor">
+            <a:schemeClr val="tx1"/>
+          </a:fontRef>
+        </p:style>
+      </p:cxnSp>
+      <p:cxnSp>
+        <p:nvCxnSpPr>
+          <p:cNvPr id="29" name="Gerade Verbindung 28"/>
+          <p:cNvCxnSpPr/>
+          <p:nvPr/>
+        </p:nvCxnSpPr>
+        <p:spPr>
+          <a:xfrm>
+            <a:off x="4355976" y="1224327"/>
+            <a:ext cx="0" cy="1922362"/>
+          </a:xfrm>
+          <a:prstGeom prst="line">
+            <a:avLst/>
+          </a:prstGeom>
+          <a:ln w="57150">
+            <a:solidFill>
+              <a:schemeClr val="bg1">
+                <a:lumMod val="50000"/>
+              </a:schemeClr>
+            </a:solidFill>
+            <a:prstDash val="sysDot"/>
+          </a:ln>
+        </p:spPr>
+        <p:style>
+          <a:lnRef idx="1">
+            <a:schemeClr val="accent1"/>
+          </a:lnRef>
+          <a:fillRef idx="0">
+            <a:schemeClr val="accent1"/>
+          </a:fillRef>
+          <a:effectRef idx="0">
+            <a:schemeClr val="accent1"/>
+          </a:effectRef>
+          <a:fontRef idx="minor">
+            <a:schemeClr val="tx1"/>
+          </a:fontRef>
+        </p:style>
+      </p:cxnSp>
+      <p:cxnSp>
+        <p:nvCxnSpPr>
+          <p:cNvPr id="30" name="Gerade Verbindung 29"/>
+          <p:cNvCxnSpPr/>
+          <p:nvPr/>
+        </p:nvCxnSpPr>
+        <p:spPr>
+          <a:xfrm>
+            <a:off x="2555776" y="4416178"/>
+            <a:ext cx="0" cy="1922362"/>
+          </a:xfrm>
+          <a:prstGeom prst="line">
+            <a:avLst/>
+          </a:prstGeom>
+          <a:ln w="57150">
+            <a:solidFill>
+              <a:schemeClr val="bg1">
+                <a:lumMod val="50000"/>
+              </a:schemeClr>
+            </a:solidFill>
+            <a:prstDash val="sysDot"/>
+          </a:ln>
+        </p:spPr>
+        <p:style>
+          <a:lnRef idx="1">
+            <a:schemeClr val="accent1"/>
+          </a:lnRef>
+          <a:fillRef idx="0">
+            <a:schemeClr val="accent1"/>
+          </a:fillRef>
+          <a:effectRef idx="0">
+            <a:schemeClr val="accent1"/>
+          </a:effectRef>
+          <a:fontRef idx="minor">
+            <a:schemeClr val="tx1"/>
+          </a:fontRef>
+        </p:style>
+      </p:cxnSp>
+      <p:cxnSp>
+        <p:nvCxnSpPr>
+          <p:cNvPr id="31" name="Gerade Verbindung 30"/>
+          <p:cNvCxnSpPr/>
+          <p:nvPr/>
+        </p:nvCxnSpPr>
+        <p:spPr>
+          <a:xfrm>
+            <a:off x="4343049" y="4426307"/>
+            <a:ext cx="0" cy="1922362"/>
+          </a:xfrm>
+          <a:prstGeom prst="line">
+            <a:avLst/>
+          </a:prstGeom>
+          <a:ln w="57150">
+            <a:solidFill>
+              <a:schemeClr val="bg1">
+                <a:lumMod val="50000"/>
+              </a:schemeClr>
+            </a:solidFill>
+            <a:prstDash val="sysDot"/>
+          </a:ln>
+        </p:spPr>
+        <p:style>
+          <a:lnRef idx="1">
+            <a:schemeClr val="accent1"/>
+          </a:lnRef>
+          <a:fillRef idx="0">
+            <a:schemeClr val="accent1"/>
+          </a:fillRef>
+          <a:effectRef idx="0">
+            <a:schemeClr val="accent1"/>
+          </a:effectRef>
+          <a:fontRef idx="minor">
+            <a:schemeClr val="tx1"/>
+          </a:fontRef>
+        </p:style>
+      </p:cxnSp>
+      <p:cxnSp>
+        <p:nvCxnSpPr>
+          <p:cNvPr id="10" name="Gerade Verbindung mit Pfeil 9"/>
+          <p:cNvCxnSpPr/>
+          <p:nvPr/>
+        </p:nvCxnSpPr>
+        <p:spPr>
+          <a:xfrm flipV="1">
+            <a:off x="1160611" y="4183609"/>
+            <a:ext cx="1" cy="2154933"/>
+          </a:xfrm>
+          <a:prstGeom prst="straightConnector1">
+            <a:avLst/>
+          </a:prstGeom>
+          <a:ln w="76200">
+            <a:solidFill>
+              <a:schemeClr val="tx1"/>
+            </a:solidFill>
+            <a:tailEnd type="arrow"/>
+          </a:ln>
+        </p:spPr>
+        <p:style>
+          <a:lnRef idx="1">
+            <a:schemeClr val="accent1"/>
+          </a:lnRef>
+          <a:fillRef idx="0">
+            <a:schemeClr val="accent1"/>
+          </a:fillRef>
+          <a:effectRef idx="0">
+            <a:schemeClr val="accent1"/>
+          </a:effectRef>
+          <a:fontRef idx="minor">
+            <a:schemeClr val="tx1"/>
+          </a:fontRef>
+        </p:style>
+      </p:cxnSp>
+      <p:sp>
+        <p:nvSpPr>
+          <p:cNvPr id="32" name="Rechteck 31"/>
+          <p:cNvSpPr/>
+          <p:nvPr/>
+        </p:nvSpPr>
+        <p:spPr>
+          <a:xfrm>
+            <a:off x="322368" y="4526101"/>
+            <a:ext cx="788318" cy="1070719"/>
+          </a:xfrm>
+          <a:prstGeom prst="rect">
+            <a:avLst/>
+          </a:prstGeom>
+          <a:solidFill>
+            <a:schemeClr val="bg1"/>
+          </a:solidFill>
+          <a:ln>
+            <a:solidFill>
+              <a:schemeClr val="bg1"/>
+            </a:solidFill>
+          </a:ln>
+        </p:spPr>
+        <p:style>
+          <a:lnRef idx="2">
+            <a:schemeClr val="accent1">
+              <a:shade val="50000"/>
+            </a:schemeClr>
+          </a:lnRef>
+          <a:fillRef idx="1">
+            <a:schemeClr val="accent1"/>
+          </a:fillRef>
+          <a:effectRef idx="0">
+            <a:schemeClr val="accent1"/>
+          </a:effectRef>
+          <a:fontRef idx="minor">
+            <a:schemeClr val="lt1"/>
+          </a:fontRef>
+        </p:style>
+        <p:txBody>
+          <a:bodyPr rtlCol="0" anchor="ctr"/>
+          <a:lstStyle/>
+          <a:p>
+            <a:pPr algn="ctr"/>
+            <a:endParaRPr lang="en-US"/>
+          </a:p>
+        </p:txBody>
+      </p:sp>
+      <mc:AlternateContent xmlns:mc="http://schemas.openxmlformats.org/markup-compatibility/2006">
+        <mc:Choice xmlns:a14="http://schemas.microsoft.com/office/drawing/2010/main" Requires="a14">
+          <p:sp>
+            <p:nvSpPr>
+              <p:cNvPr id="13" name="Textfeld 12"/>
+              <p:cNvSpPr txBox="1"/>
+              <p:nvPr/>
+            </p:nvSpPr>
+            <p:spPr>
+              <a:xfrm>
+                <a:off x="36485" y="3474104"/>
+                <a:ext cx="983090" cy="1693990"/>
+              </a:xfrm>
+              <a:prstGeom prst="rect">
+                <a:avLst/>
+              </a:prstGeom>
+              <a:noFill/>
+            </p:spPr>
+            <p:txBody>
+              <a:bodyPr wrap="none" rtlCol="0">
+                <a:spAutoFit/>
+              </a:bodyPr>
+              <a:lstStyle/>
+              <a:p>
+                <a:pPr/>
+                <a14:m>
+                  <m:oMathPara xmlns:m="http://schemas.openxmlformats.org/officeDocument/2006/math">
+                    <m:oMathParaPr>
+                      <m:jc m:val="centerGroup"/>
+                    </m:oMathParaPr>
+                    <m:oMath xmlns:m="http://schemas.openxmlformats.org/officeDocument/2006/math">
+                      <m:f>
+                        <m:fPr>
+                          <m:ctrlPr>
+                            <a:rPr lang="de-DE" sz="4400" b="0" i="1" smtClean="0">
+                              <a:latin typeface="Cambria Math"/>
+                            </a:rPr>
+                          </m:ctrlPr>
+                        </m:fPr>
+                        <m:num>
+                          <m:r>
+                            <a:rPr lang="de-DE" sz="4400" i="1" smtClean="0">
+                              <a:latin typeface="Cambria Math"/>
+                            </a:rPr>
+                            <m:t>𝑀</m:t>
+                          </m:r>
+                        </m:num>
+                        <m:den>
+                          <m:sSup>
+                            <m:sSupPr>
+                              <m:ctrlPr>
+                                <a:rPr lang="de-DE" sz="4400" b="0" i="1" smtClean="0">
+                                  <a:latin typeface="Cambria Math"/>
+                                </a:rPr>
+                              </m:ctrlPr>
+                            </m:sSupPr>
+                            <m:e>
+                              <m:r>
+                                <a:rPr lang="de-DE" sz="4400" b="0" i="1" smtClean="0">
+                                  <a:latin typeface="Cambria Math"/>
+                                </a:rPr>
+                                <m:t>𝐵</m:t>
+                              </m:r>
+                            </m:e>
+                            <m:sup>
+                              <m:f>
+                                <m:fPr>
+                                  <m:ctrlPr>
+                                    <a:rPr lang="de-DE" sz="4400" b="0" i="1" smtClean="0">
+                                      <a:latin typeface="Cambria Math"/>
+                                    </a:rPr>
+                                  </m:ctrlPr>
+                                </m:fPr>
+                                <m:num>
+                                  <m:r>
+                                    <a:rPr lang="de-DE" sz="4400" b="0" i="1" smtClean="0">
+                                      <a:latin typeface="Cambria Math"/>
+                                    </a:rPr>
+                                    <m:t>1</m:t>
+                                  </m:r>
+                                </m:num>
+                                <m:den>
+                                  <m:r>
+                                    <a:rPr lang="de-DE" sz="4400" b="0" i="1" smtClean="0">
+                                      <a:latin typeface="Cambria Math"/>
+                                    </a:rPr>
+                                    <m:t>𝛿</m:t>
+                                  </m:r>
+                                </m:den>
+                              </m:f>
+                            </m:sup>
+                          </m:sSup>
+                        </m:den>
+                      </m:f>
+                    </m:oMath>
+                  </m:oMathPara>
+                </a14:m>
+                <a:endParaRPr lang="en-US" sz="4400" dirty="0"/>
+              </a:p>
+            </p:txBody>
+          </p:sp>
+        </mc:Choice>
+        <mc:Fallback>
+          <p:sp>
+            <p:nvSpPr>
+              <p:cNvPr id="13" name="Textfeld 12"/>
+              <p:cNvSpPr txBox="1">
+                <a:spLocks noRot="1" noChangeAspect="1" noMove="1" noResize="1" noEditPoints="1" noAdjustHandles="1" noChangeArrowheads="1" noChangeShapeType="1" noTextEdit="1"/>
+              </p:cNvSpPr>
+              <p:nvPr/>
+            </p:nvSpPr>
+            <p:spPr>
+              <a:xfrm>
+                <a:off x="36485" y="3474104"/>
+                <a:ext cx="983090" cy="1693990"/>
+              </a:xfrm>
+              <a:prstGeom prst="rect">
+                <a:avLst/>
+              </a:prstGeom>
+              <a:blipFill rotWithShape="1">
+                <a:blip r:embed="rId5"/>
+                <a:stretch>
+                  <a:fillRect/>
+                </a:stretch>
+              </a:blipFill>
+            </p:spPr>
+            <p:txBody>
+              <a:bodyPr/>
+              <a:lstStyle/>
+              <a:p>
+                <a:r>
+                  <a:rPr lang="en-US">
+                    <a:noFill/>
+                  </a:rPr>
+                  <a:t> </a:t>
+                </a:r>
+              </a:p>
+            </p:txBody>
+          </p:sp>
+        </mc:Fallback>
+      </mc:AlternateContent>
+      <mc:AlternateContent xmlns:mc="http://schemas.openxmlformats.org/markup-compatibility/2006">
+        <mc:Choice xmlns:a14="http://schemas.microsoft.com/office/drawing/2010/main" Requires="a14">
+          <p:sp>
+            <p:nvSpPr>
+              <p:cNvPr id="33" name="Textfeld 32"/>
+              <p:cNvSpPr txBox="1"/>
+              <p:nvPr/>
+            </p:nvSpPr>
+            <p:spPr>
+              <a:xfrm>
+                <a:off x="1930490" y="3562410"/>
+                <a:ext cx="2892138" cy="584775"/>
+              </a:xfrm>
+              <a:prstGeom prst="rect">
+                <a:avLst/>
+              </a:prstGeom>
+              <a:noFill/>
+            </p:spPr>
+            <p:txBody>
+              <a:bodyPr wrap="none" rtlCol="0">
+                <a:spAutoFit/>
+              </a:bodyPr>
+              <a:lstStyle/>
+              <a:p>
+                <a:r>
+                  <a:rPr lang="de-DE" sz="3200" b="1" dirty="0" smtClean="0">
+                    <a:solidFill>
+                      <a:schemeClr val="tx1">
+                        <a:lumMod val="50000"/>
+                        <a:lumOff val="50000"/>
+                      </a:schemeClr>
+                    </a:solidFill>
+                    <a:latin typeface="CMU Serif" panose="02000603000000000000" pitchFamily="2" charset="0"/>
+                    <a:ea typeface="CMU Serif" panose="02000603000000000000" pitchFamily="2" charset="0"/>
+                    <a:cs typeface="CMU Serif" panose="02000603000000000000" pitchFamily="2" charset="0"/>
+                  </a:rPr>
+                  <a:t>Verschied. </a:t>
+                </a:r>
+                <a:r>
+                  <a:rPr lang="de-DE" sz="3200" b="1" dirty="0" smtClean="0">
+                    <a:solidFill>
+                      <a:schemeClr val="tx1">
+                        <a:lumMod val="50000"/>
+                        <a:lumOff val="50000"/>
+                      </a:schemeClr>
+                    </a:solidFill>
+                  </a:rPr>
+                  <a:t> </a:t>
+                </a:r>
+                <a14:m>
+                  <m:oMath xmlns:m="http://schemas.openxmlformats.org/officeDocument/2006/math">
+                    <m:r>
+                      <a:rPr lang="de-DE" sz="3200" b="1" i="1" smtClean="0">
+                        <a:solidFill>
+                          <a:schemeClr val="tx1">
+                            <a:lumMod val="50000"/>
+                            <a:lumOff val="50000"/>
+                          </a:schemeClr>
+                        </a:solidFill>
+                        <a:latin typeface="Cambria Math"/>
+                      </a:rPr>
+                      <m:t>𝑩</m:t>
+                    </m:r>
+                  </m:oMath>
+                </a14:m>
+                <a:endParaRPr lang="en-US" sz="3200" b="1" dirty="0">
+                  <a:solidFill>
+                    <a:schemeClr val="tx1">
+                      <a:lumMod val="50000"/>
+                      <a:lumOff val="50000"/>
+                    </a:schemeClr>
+                  </a:solidFill>
+                </a:endParaRPr>
+              </a:p>
+            </p:txBody>
+          </p:sp>
+        </mc:Choice>
+        <mc:Fallback>
+          <p:sp>
+            <p:nvSpPr>
+              <p:cNvPr id="33" name="Textfeld 32"/>
+              <p:cNvSpPr txBox="1">
+                <a:spLocks noRot="1" noChangeAspect="1" noMove="1" noResize="1" noEditPoints="1" noAdjustHandles="1" noChangeArrowheads="1" noChangeShapeType="1" noTextEdit="1"/>
+              </p:cNvSpPr>
+              <p:nvPr/>
+            </p:nvSpPr>
+            <p:spPr>
+              <a:xfrm>
+                <a:off x="1930490" y="3562410"/>
+                <a:ext cx="2892138" cy="584775"/>
+              </a:xfrm>
+              <a:prstGeom prst="rect">
+                <a:avLst/>
+              </a:prstGeom>
+              <a:blipFill rotWithShape="1">
+                <a:blip r:embed="rId6"/>
+                <a:stretch>
+                  <a:fillRect l="-5485" t="-11458" b="-35417"/>
+                </a:stretch>
+              </a:blipFill>
+            </p:spPr>
+            <p:txBody>
+              <a:bodyPr/>
+              <a:lstStyle/>
+              <a:p>
+                <a:r>
+                  <a:rPr lang="en-US">
+                    <a:noFill/>
+                  </a:rPr>
+                  <a:t> </a:t>
+                </a:r>
+              </a:p>
+            </p:txBody>
+          </p:sp>
+        </mc:Fallback>
+      </mc:AlternateContent>
+    </p:spTree>
+    <p:extLst>
+      <p:ext uri="{BB962C8B-B14F-4D97-AF65-F5344CB8AC3E}">
+        <p14:creationId xmlns:p14="http://schemas.microsoft.com/office/powerpoint/2010/main" val="1437105334"/>
+      </p:ext>
+    </p:extLst>
+  </p:cSld>
+  <p:clrMapOvr>
+    <a:masterClrMapping/>
+  </p:clrMapOvr>
+</p:sld>
+</file>
+
+<file path=ppt/slides/slide41.xml><?xml version="1.0" encoding="utf-8"?>
+<p:sld xmlns:a="http://schemas.openxmlformats.org/drawingml/2006/main" xmlns:r="http://schemas.openxmlformats.org/officeDocument/2006/relationships" xmlns:p="http://schemas.openxmlformats.org/presentationml/2006/main">
+  <p:cSld>
+    <p:spTree>
+      <p:nvGrpSpPr>
+        <p:cNvPr id="1" name=""/>
+        <p:cNvGrpSpPr/>
+        <p:nvPr/>
+      </p:nvGrpSpPr>
+      <p:grpSpPr>
+        <a:xfrm>
+          <a:off x="0" y="0"/>
+          <a:ext cx="0" cy="0"/>
+          <a:chOff x="0" y="0"/>
+          <a:chExt cx="0" cy="0"/>
+        </a:xfrm>
+      </p:grpSpPr>
+      <p:cxnSp>
+        <p:nvCxnSpPr>
+          <p:cNvPr id="2" name="Gerade Verbindung mit Pfeil 1"/>
+          <p:cNvCxnSpPr/>
+          <p:nvPr/>
+        </p:nvCxnSpPr>
+        <p:spPr>
+          <a:xfrm flipV="1">
+            <a:off x="1146546" y="603597"/>
+            <a:ext cx="1" cy="2305842"/>
+          </a:xfrm>
+          <a:prstGeom prst="straightConnector1">
+            <a:avLst/>
+          </a:prstGeom>
+          <a:ln w="76200">
+            <a:solidFill>
+              <a:schemeClr val="tx1"/>
+            </a:solidFill>
+            <a:tailEnd type="arrow"/>
+          </a:ln>
+        </p:spPr>
+        <p:style>
+          <a:lnRef idx="1">
+            <a:schemeClr val="accent1"/>
+          </a:lnRef>
+          <a:fillRef idx="0">
+            <a:schemeClr val="accent1"/>
+          </a:fillRef>
+          <a:effectRef idx="0">
+            <a:schemeClr val="accent1"/>
+          </a:effectRef>
+          <a:fontRef idx="minor">
+            <a:schemeClr val="tx1"/>
+          </a:fontRef>
+        </p:style>
+      </p:cxnSp>
+      <p:cxnSp>
+        <p:nvCxnSpPr>
+          <p:cNvPr id="3" name="Gerade Verbindung mit Pfeil 2"/>
+          <p:cNvCxnSpPr/>
+          <p:nvPr/>
+        </p:nvCxnSpPr>
+        <p:spPr>
+          <a:xfrm>
+            <a:off x="1146546" y="2909439"/>
+            <a:ext cx="5324420" cy="0"/>
+          </a:xfrm>
+          <a:prstGeom prst="straightConnector1">
+            <a:avLst/>
+          </a:prstGeom>
+          <a:ln w="76200">
+            <a:solidFill>
+              <a:schemeClr val="tx1"/>
+            </a:solidFill>
+            <a:tailEnd type="arrow"/>
+          </a:ln>
+        </p:spPr>
+        <p:style>
+          <a:lnRef idx="1">
+            <a:schemeClr val="accent1"/>
+          </a:lnRef>
+          <a:fillRef idx="0">
+            <a:schemeClr val="accent1"/>
+          </a:fillRef>
+          <a:effectRef idx="0">
+            <a:schemeClr val="accent1"/>
+          </a:effectRef>
+          <a:fontRef idx="minor">
+            <a:schemeClr val="tx1"/>
+          </a:fontRef>
+        </p:style>
+      </p:cxnSp>
+      <mc:AlternateContent xmlns:mc="http://schemas.openxmlformats.org/markup-compatibility/2006">
+        <mc:Choice xmlns:a14="http://schemas.microsoft.com/office/drawing/2010/main" Requires="a14">
+          <p:sp>
+            <p:nvSpPr>
+              <p:cNvPr id="4" name="Textfeld 3"/>
+              <p:cNvSpPr txBox="1"/>
+              <p:nvPr/>
+            </p:nvSpPr>
+            <p:spPr>
+              <a:xfrm>
+                <a:off x="815591" y="-48610"/>
+                <a:ext cx="698333" cy="769441"/>
+              </a:xfrm>
+              <a:prstGeom prst="rect">
+                <a:avLst/>
+              </a:prstGeom>
+              <a:noFill/>
+            </p:spPr>
+            <p:txBody>
+              <a:bodyPr wrap="none" rtlCol="0">
+                <a:spAutoFit/>
+              </a:bodyPr>
+              <a:lstStyle/>
+              <a:p>
+                <a:pPr/>
+                <a14:m>
+                  <m:oMathPara xmlns:m="http://schemas.openxmlformats.org/officeDocument/2006/math">
+                    <m:oMathParaPr>
+                      <m:jc m:val="centerGroup"/>
+                    </m:oMathParaPr>
+                    <m:oMath xmlns:m="http://schemas.openxmlformats.org/officeDocument/2006/math">
+                      <m:r>
+                        <a:rPr lang="de-DE" sz="4400" b="0" i="1" smtClean="0">
+                          <a:latin typeface="Cambria Math"/>
+                        </a:rPr>
+                        <m:t>𝐵</m:t>
+                      </m:r>
+                    </m:oMath>
+                  </m:oMathPara>
+                </a14:m>
+                <a:endParaRPr lang="de-DE" sz="4400" b="0" dirty="0" smtClean="0"/>
+              </a:p>
+            </p:txBody>
+          </p:sp>
+        </mc:Choice>
+        <mc:Fallback>
+          <p:sp>
+            <p:nvSpPr>
+              <p:cNvPr id="4" name="Textfeld 3"/>
+              <p:cNvSpPr txBox="1">
+                <a:spLocks noRot="1" noChangeAspect="1" noMove="1" noResize="1" noEditPoints="1" noAdjustHandles="1" noChangeArrowheads="1" noChangeShapeType="1" noTextEdit="1"/>
+              </p:cNvSpPr>
+              <p:nvPr/>
+            </p:nvSpPr>
+            <p:spPr>
+              <a:xfrm>
+                <a:off x="815591" y="-48610"/>
+                <a:ext cx="698333" cy="769441"/>
+              </a:xfrm>
+              <a:prstGeom prst="rect">
+                <a:avLst/>
+              </a:prstGeom>
+              <a:blipFill rotWithShape="1">
+                <a:blip r:embed="rId2"/>
+                <a:stretch>
+                  <a:fillRect/>
+                </a:stretch>
+              </a:blipFill>
+            </p:spPr>
+            <p:txBody>
+              <a:bodyPr/>
+              <a:lstStyle/>
+              <a:p>
+                <a:r>
+                  <a:rPr lang="en-US">
+                    <a:noFill/>
+                  </a:rPr>
+                  <a:t> </a:t>
+                </a:r>
+              </a:p>
+            </p:txBody>
+          </p:sp>
+        </mc:Fallback>
+      </mc:AlternateContent>
+      <mc:AlternateContent xmlns:mc="http://schemas.openxmlformats.org/markup-compatibility/2006">
+        <mc:Choice xmlns:a14="http://schemas.microsoft.com/office/drawing/2010/main" Requires="a14">
+          <p:sp>
+            <p:nvSpPr>
+              <p:cNvPr id="5" name="Textfeld 4"/>
+              <p:cNvSpPr txBox="1"/>
+              <p:nvPr/>
+            </p:nvSpPr>
+            <p:spPr>
+              <a:xfrm>
+                <a:off x="6470966" y="2601563"/>
+                <a:ext cx="661912" cy="769441"/>
+              </a:xfrm>
+              <a:prstGeom prst="rect">
+                <a:avLst/>
+              </a:prstGeom>
+              <a:noFill/>
+            </p:spPr>
+            <p:txBody>
+              <a:bodyPr wrap="none" rtlCol="0">
+                <a:spAutoFit/>
+              </a:bodyPr>
+              <a:lstStyle/>
+              <a:p>
+                <a:pPr/>
+                <a14:m>
+                  <m:oMathPara xmlns:m="http://schemas.openxmlformats.org/officeDocument/2006/math">
+                    <m:oMathParaPr>
+                      <m:jc m:val="centerGroup"/>
+                    </m:oMathParaPr>
+                    <m:oMath xmlns:m="http://schemas.openxmlformats.org/officeDocument/2006/math">
+                      <m:r>
+                        <a:rPr lang="de-DE" sz="4400" b="0" i="1" smtClean="0">
+                          <a:latin typeface="Cambria Math"/>
+                        </a:rPr>
+                        <m:t>𝑇</m:t>
+                      </m:r>
+                    </m:oMath>
+                  </m:oMathPara>
+                </a14:m>
+                <a:endParaRPr lang="en-US" sz="4400" dirty="0"/>
+              </a:p>
+            </p:txBody>
+          </p:sp>
+        </mc:Choice>
+        <mc:Fallback>
+          <p:sp>
+            <p:nvSpPr>
+              <p:cNvPr id="5" name="Textfeld 4"/>
+              <p:cNvSpPr txBox="1">
+                <a:spLocks noRot="1" noChangeAspect="1" noMove="1" noResize="1" noEditPoints="1" noAdjustHandles="1" noChangeArrowheads="1" noChangeShapeType="1" noTextEdit="1"/>
+              </p:cNvSpPr>
+              <p:nvPr/>
+            </p:nvSpPr>
+            <p:spPr>
+              <a:xfrm>
+                <a:off x="6470966" y="2601563"/>
+                <a:ext cx="661912" cy="769441"/>
+              </a:xfrm>
+              <a:prstGeom prst="rect">
+                <a:avLst/>
+              </a:prstGeom>
+              <a:blipFill rotWithShape="1">
+                <a:blip r:embed="rId3"/>
+                <a:stretch>
+                  <a:fillRect/>
+                </a:stretch>
+              </a:blipFill>
+            </p:spPr>
+            <p:txBody>
+              <a:bodyPr/>
+              <a:lstStyle/>
+              <a:p>
+                <a:r>
+                  <a:rPr lang="en-US">
+                    <a:noFill/>
+                  </a:rPr>
+                  <a:t> </a:t>
+                </a:r>
+              </a:p>
+            </p:txBody>
+          </p:sp>
+        </mc:Fallback>
+      </mc:AlternateContent>
+      <p:cxnSp>
+        <p:nvCxnSpPr>
+          <p:cNvPr id="6" name="Gerade Verbindung mit Pfeil 5"/>
+          <p:cNvCxnSpPr/>
+          <p:nvPr/>
+        </p:nvCxnSpPr>
+        <p:spPr>
+          <a:xfrm>
+            <a:off x="1140336" y="5951605"/>
+            <a:ext cx="5324420" cy="0"/>
+          </a:xfrm>
+          <a:prstGeom prst="straightConnector1">
+            <a:avLst/>
+          </a:prstGeom>
+          <a:ln w="76200">
+            <a:solidFill>
+              <a:schemeClr val="tx1"/>
+            </a:solidFill>
+            <a:tailEnd type="arrow"/>
+          </a:ln>
+        </p:spPr>
+        <p:style>
+          <a:lnRef idx="1">
+            <a:schemeClr val="accent1"/>
+          </a:lnRef>
+          <a:fillRef idx="0">
+            <a:schemeClr val="accent1"/>
+          </a:fillRef>
+          <a:effectRef idx="0">
+            <a:schemeClr val="accent1"/>
+          </a:effectRef>
+          <a:fontRef idx="minor">
+            <a:schemeClr val="tx1"/>
+          </a:fontRef>
+        </p:style>
+      </p:cxnSp>
+      <mc:AlternateContent xmlns:mc="http://schemas.openxmlformats.org/markup-compatibility/2006">
+        <mc:Choice xmlns:a14="http://schemas.microsoft.com/office/drawing/2010/main" Requires="a14">
+          <p:sp>
+            <p:nvSpPr>
+              <p:cNvPr id="7" name="Textfeld 6"/>
+              <p:cNvSpPr txBox="1"/>
+              <p:nvPr/>
+            </p:nvSpPr>
+            <p:spPr>
+              <a:xfrm>
+                <a:off x="6483727" y="5490567"/>
+                <a:ext cx="704745" cy="830997"/>
+              </a:xfrm>
+              <a:prstGeom prst="rect">
+                <a:avLst/>
+              </a:prstGeom>
+              <a:noFill/>
+            </p:spPr>
+            <p:txBody>
+              <a:bodyPr wrap="none" rtlCol="0">
+                <a:spAutoFit/>
+              </a:bodyPr>
+              <a:lstStyle/>
+              <a:p>
+                <a:pPr/>
+                <a14:m>
+                  <m:oMathPara xmlns:m="http://schemas.openxmlformats.org/officeDocument/2006/math">
+                    <m:oMathParaPr>
+                      <m:jc m:val="centerGroup"/>
+                    </m:oMathParaPr>
+                    <m:oMath xmlns:m="http://schemas.openxmlformats.org/officeDocument/2006/math">
+                      <m:r>
+                        <a:rPr lang="de-DE" sz="4800" b="0" i="1" smtClean="0">
+                          <a:latin typeface="Cambria Math"/>
+                        </a:rPr>
+                        <m:t>𝑇</m:t>
+                      </m:r>
+                    </m:oMath>
+                  </m:oMathPara>
+                </a14:m>
+                <a:endParaRPr lang="en-US" sz="4800" dirty="0"/>
+              </a:p>
+            </p:txBody>
+          </p:sp>
+        </mc:Choice>
+        <mc:Fallback>
+          <p:sp>
+            <p:nvSpPr>
+              <p:cNvPr id="7" name="Textfeld 6"/>
+              <p:cNvSpPr txBox="1">
+                <a:spLocks noRot="1" noChangeAspect="1" noMove="1" noResize="1" noEditPoints="1" noAdjustHandles="1" noChangeArrowheads="1" noChangeShapeType="1" noTextEdit="1"/>
+              </p:cNvSpPr>
+              <p:nvPr/>
+            </p:nvSpPr>
+            <p:spPr>
+              <a:xfrm>
+                <a:off x="6483727" y="5490567"/>
+                <a:ext cx="704745" cy="830997"/>
+              </a:xfrm>
+              <a:prstGeom prst="rect">
+                <a:avLst/>
+              </a:prstGeom>
+              <a:blipFill rotWithShape="1">
+                <a:blip r:embed="rId4"/>
+                <a:stretch>
+                  <a:fillRect/>
+                </a:stretch>
+              </a:blipFill>
+            </p:spPr>
+            <p:txBody>
+              <a:bodyPr/>
+              <a:lstStyle/>
+              <a:p>
+                <a:r>
+                  <a:rPr lang="en-US">
+                    <a:noFill/>
+                  </a:rPr>
+                  <a:t> </a:t>
+                </a:r>
+              </a:p>
+            </p:txBody>
+          </p:sp>
+        </mc:Fallback>
+      </mc:AlternateContent>
+      <p:cxnSp>
+        <p:nvCxnSpPr>
+          <p:cNvPr id="20" name="Gerade Verbindung mit Pfeil 19"/>
+          <p:cNvCxnSpPr/>
+          <p:nvPr/>
+        </p:nvCxnSpPr>
+        <p:spPr>
+          <a:xfrm flipV="1">
+            <a:off x="1140336" y="3796674"/>
+            <a:ext cx="1" cy="2154933"/>
+          </a:xfrm>
+          <a:prstGeom prst="straightConnector1">
+            <a:avLst/>
+          </a:prstGeom>
+          <a:ln w="76200">
+            <a:solidFill>
+              <a:schemeClr val="tx1"/>
+            </a:solidFill>
+            <a:tailEnd type="arrow"/>
+          </a:ln>
+        </p:spPr>
+        <p:style>
+          <a:lnRef idx="1">
+            <a:schemeClr val="accent1"/>
+          </a:lnRef>
+          <a:fillRef idx="0">
+            <a:schemeClr val="accent1"/>
+          </a:fillRef>
+          <a:effectRef idx="0">
+            <a:schemeClr val="accent1"/>
+          </a:effectRef>
+          <a:fontRef idx="minor">
+            <a:schemeClr val="tx1"/>
+          </a:fontRef>
+        </p:style>
+      </p:cxnSp>
+      <p:sp>
+        <p:nvSpPr>
+          <p:cNvPr id="21" name="Rechteck 20"/>
+          <p:cNvSpPr/>
+          <p:nvPr/>
+        </p:nvSpPr>
+        <p:spPr>
+          <a:xfrm>
+            <a:off x="322368" y="4288851"/>
+            <a:ext cx="788318" cy="1070719"/>
+          </a:xfrm>
+          <a:prstGeom prst="rect">
+            <a:avLst/>
+          </a:prstGeom>
+          <a:solidFill>
+            <a:schemeClr val="bg1"/>
+          </a:solidFill>
+          <a:ln>
+            <a:solidFill>
+              <a:schemeClr val="bg1"/>
+            </a:solidFill>
+          </a:ln>
+        </p:spPr>
+        <p:style>
+          <a:lnRef idx="2">
+            <a:schemeClr val="accent1">
+              <a:shade val="50000"/>
+            </a:schemeClr>
+          </a:lnRef>
+          <a:fillRef idx="1">
+            <a:schemeClr val="accent1"/>
+          </a:fillRef>
+          <a:effectRef idx="0">
+            <a:schemeClr val="accent1"/>
+          </a:effectRef>
+          <a:fontRef idx="minor">
+            <a:schemeClr val="lt1"/>
+          </a:fontRef>
+        </p:style>
+        <p:txBody>
+          <a:bodyPr rtlCol="0" anchor="ctr"/>
+          <a:lstStyle/>
+          <a:p>
+            <a:pPr algn="ctr"/>
+            <a:endParaRPr lang="en-US"/>
+          </a:p>
+        </p:txBody>
+      </p:sp>
+      <mc:AlternateContent xmlns:mc="http://schemas.openxmlformats.org/markup-compatibility/2006">
+        <mc:Choice xmlns:a14="http://schemas.microsoft.com/office/drawing/2010/main" Requires="a14">
+          <p:sp>
+            <p:nvSpPr>
+              <p:cNvPr id="22" name="Textfeld 21"/>
+              <p:cNvSpPr txBox="1"/>
+              <p:nvPr/>
+            </p:nvSpPr>
+            <p:spPr>
+              <a:xfrm>
+                <a:off x="811573" y="3032478"/>
+                <a:ext cx="698333" cy="769441"/>
+              </a:xfrm>
+              <a:prstGeom prst="rect">
+                <a:avLst/>
+              </a:prstGeom>
+              <a:noFill/>
+            </p:spPr>
+            <p:txBody>
+              <a:bodyPr wrap="none" rtlCol="0">
+                <a:spAutoFit/>
+              </a:bodyPr>
+              <a:lstStyle/>
+              <a:p>
+                <a:pPr/>
+                <a14:m>
+                  <m:oMathPara xmlns:m="http://schemas.openxmlformats.org/officeDocument/2006/math">
+                    <m:oMathParaPr>
+                      <m:jc m:val="centerGroup"/>
+                    </m:oMathParaPr>
+                    <m:oMath xmlns:m="http://schemas.openxmlformats.org/officeDocument/2006/math">
+                      <m:r>
+                        <a:rPr lang="de-DE" sz="4400" b="0" i="1" smtClean="0">
+                          <a:latin typeface="Cambria Math"/>
+                        </a:rPr>
+                        <m:t>𝐵</m:t>
+                      </m:r>
+                    </m:oMath>
+                  </m:oMathPara>
+                </a14:m>
+                <a:endParaRPr lang="en-US" sz="4400" dirty="0"/>
+              </a:p>
+            </p:txBody>
+          </p:sp>
+        </mc:Choice>
+        <mc:Fallback>
+          <p:sp>
+            <p:nvSpPr>
+              <p:cNvPr id="22" name="Textfeld 21"/>
+              <p:cNvSpPr txBox="1">
+                <a:spLocks noRot="1" noChangeAspect="1" noMove="1" noResize="1" noEditPoints="1" noAdjustHandles="1" noChangeArrowheads="1" noChangeShapeType="1" noTextEdit="1"/>
+              </p:cNvSpPr>
+              <p:nvPr/>
+            </p:nvSpPr>
+            <p:spPr>
+              <a:xfrm>
+                <a:off x="811573" y="3032478"/>
+                <a:ext cx="698333" cy="769441"/>
+              </a:xfrm>
+              <a:prstGeom prst="rect">
+                <a:avLst/>
+              </a:prstGeom>
+              <a:blipFill rotWithShape="1">
+                <a:blip r:embed="rId5"/>
+                <a:stretch>
+                  <a:fillRect/>
+                </a:stretch>
+              </a:blipFill>
+            </p:spPr>
+            <p:txBody>
+              <a:bodyPr/>
+              <a:lstStyle/>
+              <a:p>
+                <a:r>
+                  <a:rPr lang="en-US">
+                    <a:noFill/>
+                  </a:rPr>
+                  <a:t> </a:t>
+                </a:r>
+              </a:p>
+            </p:txBody>
+          </p:sp>
+        </mc:Fallback>
+      </mc:AlternateContent>
+      <mc:AlternateContent xmlns:mc="http://schemas.openxmlformats.org/markup-compatibility/2006">
+        <mc:Choice xmlns:a14="http://schemas.microsoft.com/office/drawing/2010/main" Requires="a14">
+          <p:sp>
+            <p:nvSpPr>
+              <p:cNvPr id="24" name="Textfeld 23"/>
+              <p:cNvSpPr txBox="1"/>
+              <p:nvPr/>
+            </p:nvSpPr>
+            <p:spPr>
+              <a:xfrm>
+                <a:off x="3387185" y="2988998"/>
+                <a:ext cx="802592" cy="769441"/>
+              </a:xfrm>
+              <a:prstGeom prst="rect">
+                <a:avLst/>
+              </a:prstGeom>
+              <a:noFill/>
+            </p:spPr>
+            <p:txBody>
+              <a:bodyPr wrap="none" rtlCol="0">
+                <a:spAutoFit/>
+              </a:bodyPr>
+              <a:lstStyle/>
+              <a:p>
+                <a:pPr/>
+                <a14:m>
+                  <m:oMathPara xmlns:m="http://schemas.openxmlformats.org/officeDocument/2006/math">
+                    <m:oMathParaPr>
+                      <m:jc m:val="centerGroup"/>
+                    </m:oMathParaPr>
+                    <m:oMath xmlns:m="http://schemas.openxmlformats.org/officeDocument/2006/math">
+                      <m:sSub>
+                        <m:sSubPr>
+                          <m:ctrlPr>
+                            <a:rPr lang="de-DE" sz="4400" b="0" i="0" smtClean="0">
+                              <a:latin typeface="Cambria Math"/>
+                            </a:rPr>
+                          </m:ctrlPr>
+                        </m:sSubPr>
+                        <m:e>
+                          <m:r>
+                            <a:rPr lang="de-DE" sz="4400" b="0" i="1" smtClean="0">
+                              <a:latin typeface="Cambria Math"/>
+                            </a:rPr>
+                            <m:t>𝑇</m:t>
+                          </m:r>
+                        </m:e>
+                        <m:sub>
+                          <m:r>
+                            <m:rPr>
+                              <m:sty m:val="p"/>
+                            </m:rPr>
+                            <a:rPr lang="de-DE" sz="4400" b="0" i="0" smtClean="0">
+                              <a:latin typeface="Cambria Math"/>
+                            </a:rPr>
+                            <m:t>c</m:t>
+                          </m:r>
+                        </m:sub>
+                      </m:sSub>
+                    </m:oMath>
+                  </m:oMathPara>
+                </a14:m>
+                <a:endParaRPr lang="en-US" sz="4400" dirty="0"/>
+              </a:p>
+            </p:txBody>
+          </p:sp>
+        </mc:Choice>
+        <mc:Fallback>
+          <p:sp>
+            <p:nvSpPr>
+              <p:cNvPr id="24" name="Textfeld 23"/>
+              <p:cNvSpPr txBox="1">
+                <a:spLocks noRot="1" noChangeAspect="1" noMove="1" noResize="1" noEditPoints="1" noAdjustHandles="1" noChangeArrowheads="1" noChangeShapeType="1" noTextEdit="1"/>
+              </p:cNvSpPr>
+              <p:nvPr/>
+            </p:nvSpPr>
+            <p:spPr>
+              <a:xfrm>
+                <a:off x="3387185" y="2988998"/>
+                <a:ext cx="802592" cy="769441"/>
+              </a:xfrm>
+              <a:prstGeom prst="rect">
+                <a:avLst/>
+              </a:prstGeom>
+              <a:blipFill rotWithShape="1">
+                <a:blip r:embed="rId6"/>
+                <a:stretch>
+                  <a:fillRect/>
+                </a:stretch>
+              </a:blipFill>
+            </p:spPr>
+            <p:txBody>
+              <a:bodyPr/>
+              <a:lstStyle/>
+              <a:p>
+                <a:r>
+                  <a:rPr lang="en-US">
+                    <a:noFill/>
+                  </a:rPr>
+                  <a:t> </a:t>
+                </a:r>
+              </a:p>
+            </p:txBody>
+          </p:sp>
+        </mc:Fallback>
+      </mc:AlternateContent>
+      <mc:AlternateContent xmlns:mc="http://schemas.openxmlformats.org/markup-compatibility/2006">
+        <mc:Choice xmlns:a14="http://schemas.microsoft.com/office/drawing/2010/main" Requires="a14">
+          <p:sp>
+            <p:nvSpPr>
+              <p:cNvPr id="25" name="Textfeld 24"/>
+              <p:cNvSpPr txBox="1"/>
+              <p:nvPr/>
+            </p:nvSpPr>
+            <p:spPr>
+              <a:xfrm>
+                <a:off x="3407460" y="5967227"/>
+                <a:ext cx="802592" cy="769441"/>
+              </a:xfrm>
+              <a:prstGeom prst="rect">
+                <a:avLst/>
+              </a:prstGeom>
+              <a:noFill/>
+            </p:spPr>
+            <p:txBody>
+              <a:bodyPr wrap="none" rtlCol="0">
+                <a:spAutoFit/>
+              </a:bodyPr>
+              <a:lstStyle/>
+              <a:p>
+                <a:pPr/>
+                <a14:m>
+                  <m:oMathPara xmlns:m="http://schemas.openxmlformats.org/officeDocument/2006/math">
+                    <m:oMathParaPr>
+                      <m:jc m:val="centerGroup"/>
+                    </m:oMathParaPr>
+                    <m:oMath xmlns:m="http://schemas.openxmlformats.org/officeDocument/2006/math">
+                      <m:sSub>
+                        <m:sSubPr>
+                          <m:ctrlPr>
+                            <a:rPr lang="de-DE" sz="4400" b="0" i="0" smtClean="0">
+                              <a:latin typeface="Cambria Math"/>
+                            </a:rPr>
+                          </m:ctrlPr>
+                        </m:sSubPr>
+                        <m:e>
+                          <m:r>
+                            <a:rPr lang="de-DE" sz="4400" b="0" i="1" smtClean="0">
+                              <a:latin typeface="Cambria Math"/>
+                            </a:rPr>
+                            <m:t>𝑇</m:t>
+                          </m:r>
+                        </m:e>
+                        <m:sub>
+                          <m:r>
+                            <m:rPr>
+                              <m:sty m:val="p"/>
+                            </m:rPr>
+                            <a:rPr lang="de-DE" sz="4400" b="0" i="0" smtClean="0">
+                              <a:latin typeface="Cambria Math"/>
+                            </a:rPr>
+                            <m:t>c</m:t>
+                          </m:r>
+                        </m:sub>
+                      </m:sSub>
+                    </m:oMath>
+                  </m:oMathPara>
+                </a14:m>
+                <a:endParaRPr lang="en-US" sz="4400" dirty="0"/>
+              </a:p>
+            </p:txBody>
+          </p:sp>
+        </mc:Choice>
+        <mc:Fallback>
+          <p:sp>
+            <p:nvSpPr>
+              <p:cNvPr id="25" name="Textfeld 24"/>
+              <p:cNvSpPr txBox="1">
+                <a:spLocks noRot="1" noChangeAspect="1" noMove="1" noResize="1" noEditPoints="1" noAdjustHandles="1" noChangeArrowheads="1" noChangeShapeType="1" noTextEdit="1"/>
+              </p:cNvSpPr>
+              <p:nvPr/>
+            </p:nvSpPr>
+            <p:spPr>
+              <a:xfrm>
+                <a:off x="3407460" y="5967227"/>
+                <a:ext cx="802592" cy="769441"/>
+              </a:xfrm>
+              <a:prstGeom prst="rect">
+                <a:avLst/>
+              </a:prstGeom>
+              <a:blipFill rotWithShape="1">
+                <a:blip r:embed="rId7"/>
+                <a:stretch>
+                  <a:fillRect/>
+                </a:stretch>
+              </a:blipFill>
+            </p:spPr>
+            <p:txBody>
+              <a:bodyPr/>
+              <a:lstStyle/>
+              <a:p>
+                <a:r>
+                  <a:rPr lang="en-US">
+                    <a:noFill/>
+                  </a:rPr>
+                  <a:t> </a:t>
+                </a:r>
+              </a:p>
+            </p:txBody>
+          </p:sp>
+        </mc:Fallback>
+      </mc:AlternateContent>
+      <mc:AlternateContent xmlns:mc="http://schemas.openxmlformats.org/markup-compatibility/2006">
+        <mc:Choice xmlns:a14="http://schemas.microsoft.com/office/drawing/2010/main" Requires="a14">
+          <p:sp>
+            <p:nvSpPr>
+              <p:cNvPr id="26" name="Textfeld 25"/>
+              <p:cNvSpPr txBox="1"/>
+              <p:nvPr/>
+            </p:nvSpPr>
+            <p:spPr>
+              <a:xfrm>
+                <a:off x="6464756" y="720831"/>
+                <a:ext cx="1745927" cy="769441"/>
+              </a:xfrm>
+              <a:prstGeom prst="rect">
+                <a:avLst/>
+              </a:prstGeom>
+              <a:noFill/>
+              <a:ln>
+                <a:solidFill>
+                  <a:schemeClr val="tx1"/>
+                </a:solidFill>
+              </a:ln>
+            </p:spPr>
+            <p:txBody>
+              <a:bodyPr wrap="none" rtlCol="0">
+                <a:spAutoFit/>
+              </a:bodyPr>
+              <a:lstStyle/>
+              <a:p>
+                <a:pPr/>
+                <a14:m>
+                  <m:oMathPara xmlns:m="http://schemas.openxmlformats.org/officeDocument/2006/math">
+                    <m:oMathParaPr>
+                      <m:jc m:val="centerGroup"/>
+                    </m:oMathParaPr>
+                    <m:oMath xmlns:m="http://schemas.openxmlformats.org/officeDocument/2006/math">
+                      <m:r>
+                        <a:rPr lang="de-DE" sz="4400" b="0" i="1" smtClean="0">
+                          <a:latin typeface="Cambria Math"/>
+                        </a:rPr>
+                        <m:t>𝐵</m:t>
+                      </m:r>
+                      <m:r>
+                        <a:rPr lang="de-DE" sz="4400" b="0" i="1" smtClean="0">
+                          <a:latin typeface="Cambria Math"/>
+                        </a:rPr>
+                        <m:t>=0</m:t>
+                      </m:r>
+                    </m:oMath>
+                  </m:oMathPara>
+                </a14:m>
+                <a:endParaRPr lang="en-US" sz="4400" dirty="0"/>
+              </a:p>
+            </p:txBody>
+          </p:sp>
+        </mc:Choice>
+        <mc:Fallback>
+          <p:sp>
+            <p:nvSpPr>
+              <p:cNvPr id="26" name="Textfeld 25"/>
+              <p:cNvSpPr txBox="1">
+                <a:spLocks noRot="1" noChangeAspect="1" noMove="1" noResize="1" noEditPoints="1" noAdjustHandles="1" noChangeArrowheads="1" noChangeShapeType="1" noTextEdit="1"/>
+              </p:cNvSpPr>
+              <p:nvPr/>
+            </p:nvSpPr>
+            <p:spPr>
+              <a:xfrm>
+                <a:off x="6464756" y="720831"/>
+                <a:ext cx="1745927" cy="769441"/>
+              </a:xfrm>
+              <a:prstGeom prst="rect">
+                <a:avLst/>
+              </a:prstGeom>
+              <a:blipFill rotWithShape="1">
+                <a:blip r:embed="rId8"/>
+                <a:stretch>
+                  <a:fillRect/>
+                </a:stretch>
+              </a:blipFill>
+              <a:ln>
+                <a:solidFill>
+                  <a:schemeClr val="tx1"/>
+                </a:solidFill>
+              </a:ln>
+            </p:spPr>
+            <p:txBody>
+              <a:bodyPr/>
+              <a:lstStyle/>
+              <a:p>
+                <a:r>
+                  <a:rPr lang="en-US">
+                    <a:noFill/>
+                  </a:rPr>
+                  <a:t> </a:t>
+                </a:r>
+              </a:p>
+            </p:txBody>
+          </p:sp>
+        </mc:Fallback>
+      </mc:AlternateContent>
+      <mc:AlternateContent xmlns:mc="http://schemas.openxmlformats.org/markup-compatibility/2006">
+        <mc:Choice xmlns:a14="http://schemas.microsoft.com/office/drawing/2010/main" Requires="a14">
+          <p:sp>
+            <p:nvSpPr>
+              <p:cNvPr id="28" name="Textfeld 27"/>
+              <p:cNvSpPr txBox="1"/>
+              <p:nvPr/>
+            </p:nvSpPr>
+            <p:spPr>
+              <a:xfrm>
+                <a:off x="6464755" y="4439489"/>
+                <a:ext cx="1745927" cy="769441"/>
+              </a:xfrm>
+              <a:prstGeom prst="rect">
+                <a:avLst/>
+              </a:prstGeom>
+              <a:noFill/>
+              <a:ln>
+                <a:solidFill>
+                  <a:schemeClr val="tx1"/>
+                </a:solidFill>
+              </a:ln>
+            </p:spPr>
+            <p:txBody>
+              <a:bodyPr wrap="none" rtlCol="0">
+                <a:spAutoFit/>
+              </a:bodyPr>
+              <a:lstStyle/>
+              <a:p>
+                <a:pPr/>
+                <a14:m>
+                  <m:oMathPara xmlns:m="http://schemas.openxmlformats.org/officeDocument/2006/math">
+                    <m:oMathParaPr>
+                      <m:jc m:val="centerGroup"/>
+                    </m:oMathParaPr>
+                    <m:oMath xmlns:m="http://schemas.openxmlformats.org/officeDocument/2006/math">
+                      <m:r>
+                        <a:rPr lang="de-DE" sz="4400" b="0" i="1" smtClean="0">
+                          <a:latin typeface="Cambria Math"/>
+                        </a:rPr>
+                        <m:t>𝐵</m:t>
+                      </m:r>
+                      <m:r>
+                        <a:rPr lang="de-DE" sz="4400" b="0" i="1" smtClean="0">
+                          <a:latin typeface="Cambria Math"/>
+                        </a:rPr>
+                        <m:t>≠0</m:t>
+                      </m:r>
+                    </m:oMath>
+                  </m:oMathPara>
+                </a14:m>
+                <a:endParaRPr lang="en-US" sz="4400" dirty="0"/>
+              </a:p>
+            </p:txBody>
+          </p:sp>
+        </mc:Choice>
+        <mc:Fallback>
+          <p:sp>
+            <p:nvSpPr>
+              <p:cNvPr id="28" name="Textfeld 27"/>
+              <p:cNvSpPr txBox="1">
+                <a:spLocks noRot="1" noChangeAspect="1" noMove="1" noResize="1" noEditPoints="1" noAdjustHandles="1" noChangeArrowheads="1" noChangeShapeType="1" noTextEdit="1"/>
+              </p:cNvSpPr>
+              <p:nvPr/>
+            </p:nvSpPr>
+            <p:spPr>
+              <a:xfrm>
+                <a:off x="6464755" y="4439489"/>
+                <a:ext cx="1745927" cy="769441"/>
+              </a:xfrm>
+              <a:prstGeom prst="rect">
+                <a:avLst/>
+              </a:prstGeom>
+              <a:blipFill rotWithShape="1">
+                <a:blip r:embed="rId9"/>
+                <a:stretch>
+                  <a:fillRect/>
+                </a:stretch>
+              </a:blipFill>
+              <a:ln>
+                <a:solidFill>
+                  <a:schemeClr val="tx1"/>
+                </a:solidFill>
+              </a:ln>
+            </p:spPr>
+            <p:txBody>
+              <a:bodyPr/>
+              <a:lstStyle/>
+              <a:p>
+                <a:r>
+                  <a:rPr lang="en-US">
+                    <a:noFill/>
+                  </a:rPr>
+                  <a:t> </a:t>
+                </a:r>
+              </a:p>
+            </p:txBody>
+          </p:sp>
+        </mc:Fallback>
+      </mc:AlternateContent>
+      <p:sp>
+        <p:nvSpPr>
+          <p:cNvPr id="29" name="Ellipse 28"/>
+          <p:cNvSpPr/>
+          <p:nvPr/>
+        </p:nvSpPr>
+        <p:spPr>
+          <a:xfrm>
+            <a:off x="3615653" y="5761840"/>
+            <a:ext cx="289495" cy="307316"/>
+          </a:xfrm>
+          <a:prstGeom prst="ellipse">
+            <a:avLst/>
+          </a:prstGeom>
+        </p:spPr>
+        <p:style>
+          <a:lnRef idx="2">
+            <a:schemeClr val="accent1">
+              <a:shade val="50000"/>
+            </a:schemeClr>
+          </a:lnRef>
+          <a:fillRef idx="1">
+            <a:schemeClr val="accent1"/>
+          </a:fillRef>
+          <a:effectRef idx="0">
+            <a:schemeClr val="accent1"/>
+          </a:effectRef>
+          <a:fontRef idx="minor">
+            <a:schemeClr val="lt1"/>
+          </a:fontRef>
+        </p:style>
+        <p:txBody>
+          <a:bodyPr rtlCol="0" anchor="ctr"/>
+          <a:lstStyle/>
+          <a:p>
+            <a:pPr algn="ctr"/>
+            <a:endParaRPr lang="en-US"/>
+          </a:p>
+        </p:txBody>
+      </p:sp>
+      <p:sp>
+        <p:nvSpPr>
+          <p:cNvPr id="30" name="Ellipse 29"/>
+          <p:cNvSpPr/>
+          <p:nvPr/>
+        </p:nvSpPr>
+        <p:spPr>
+          <a:xfrm>
+            <a:off x="3615653" y="2743815"/>
+            <a:ext cx="289496" cy="288663"/>
+          </a:xfrm>
+          <a:prstGeom prst="ellipse">
+            <a:avLst/>
+          </a:prstGeom>
+        </p:spPr>
+        <p:style>
+          <a:lnRef idx="2">
+            <a:schemeClr val="accent1">
+              <a:shade val="50000"/>
+            </a:schemeClr>
+          </a:lnRef>
+          <a:fillRef idx="1">
+            <a:schemeClr val="accent1"/>
+          </a:fillRef>
+          <a:effectRef idx="0">
+            <a:schemeClr val="accent1"/>
+          </a:effectRef>
+          <a:fontRef idx="minor">
+            <a:schemeClr val="lt1"/>
+          </a:fontRef>
+        </p:style>
+        <p:txBody>
+          <a:bodyPr rtlCol="0" anchor="ctr"/>
+          <a:lstStyle/>
+          <a:p>
+            <a:pPr algn="ctr"/>
+            <a:endParaRPr lang="en-US"/>
+          </a:p>
+        </p:txBody>
+      </p:sp>
+      <p:sp>
+        <p:nvSpPr>
+          <p:cNvPr id="32" name="Freihandform 31"/>
+          <p:cNvSpPr/>
+          <p:nvPr/>
+        </p:nvSpPr>
+        <p:spPr>
+          <a:xfrm>
+            <a:off x="3905148" y="4097462"/>
+            <a:ext cx="1173708" cy="1815152"/>
+          </a:xfrm>
+          <a:custGeom>
+            <a:avLst/>
+            <a:gdLst>
+              <a:gd name="connsiteX0" fmla="*/ 0 w 1173708"/>
+              <a:gd name="connsiteY0" fmla="*/ 1815152 h 1815152"/>
+              <a:gd name="connsiteX1" fmla="*/ 232012 w 1173708"/>
+              <a:gd name="connsiteY1" fmla="*/ 1705970 h 1815152"/>
+              <a:gd name="connsiteX2" fmla="*/ 614150 w 1173708"/>
+              <a:gd name="connsiteY2" fmla="*/ 1378424 h 1815152"/>
+              <a:gd name="connsiteX3" fmla="*/ 996287 w 1173708"/>
+              <a:gd name="connsiteY3" fmla="*/ 709683 h 1815152"/>
+              <a:gd name="connsiteX4" fmla="*/ 1173708 w 1173708"/>
+              <a:gd name="connsiteY4" fmla="*/ 0 h 1815152"/>
+            </a:gdLst>
+            <a:ahLst/>
+            <a:cxnLst>
+              <a:cxn ang="0">
+                <a:pos x="connsiteX0" y="connsiteY0"/>
+              </a:cxn>
+              <a:cxn ang="0">
+                <a:pos x="connsiteX1" y="connsiteY1"/>
+              </a:cxn>
+              <a:cxn ang="0">
+                <a:pos x="connsiteX2" y="connsiteY2"/>
+              </a:cxn>
+              <a:cxn ang="0">
+                <a:pos x="connsiteX3" y="connsiteY3"/>
+              </a:cxn>
+              <a:cxn ang="0">
+                <a:pos x="connsiteX4" y="connsiteY4"/>
+              </a:cxn>
+            </a:cxnLst>
+            <a:rect l="l" t="t" r="r" b="b"/>
+            <a:pathLst>
+              <a:path w="1173708" h="1815152">
+                <a:moveTo>
+                  <a:pt x="0" y="1815152"/>
+                </a:moveTo>
+                <a:cubicBezTo>
+                  <a:pt x="64827" y="1796955"/>
+                  <a:pt x="129654" y="1778758"/>
+                  <a:pt x="232012" y="1705970"/>
+                </a:cubicBezTo>
+                <a:cubicBezTo>
+                  <a:pt x="334370" y="1633182"/>
+                  <a:pt x="486771" y="1544472"/>
+                  <a:pt x="614150" y="1378424"/>
+                </a:cubicBezTo>
+                <a:cubicBezTo>
+                  <a:pt x="741529" y="1212376"/>
+                  <a:pt x="903027" y="939420"/>
+                  <a:pt x="996287" y="709683"/>
+                </a:cubicBezTo>
+                <a:cubicBezTo>
+                  <a:pt x="1089547" y="479946"/>
+                  <a:pt x="1131627" y="239973"/>
+                  <a:pt x="1173708" y="0"/>
+                </a:cubicBezTo>
+              </a:path>
+            </a:pathLst>
+          </a:custGeom>
+          <a:noFill/>
+          <a:ln w="76200"/>
+        </p:spPr>
+        <p:style>
+          <a:lnRef idx="2">
+            <a:schemeClr val="accent1">
+              <a:shade val="50000"/>
+            </a:schemeClr>
+          </a:lnRef>
+          <a:fillRef idx="1">
+            <a:schemeClr val="accent1"/>
+          </a:fillRef>
+          <a:effectRef idx="0">
+            <a:schemeClr val="accent1"/>
+          </a:effectRef>
+          <a:fontRef idx="minor">
+            <a:schemeClr val="lt1"/>
+          </a:fontRef>
+        </p:style>
+        <p:txBody>
+          <a:bodyPr rtlCol="0" anchor="ctr"/>
+          <a:lstStyle/>
+          <a:p>
+            <a:pPr algn="ctr"/>
+            <a:endParaRPr lang="en-US"/>
+          </a:p>
+        </p:txBody>
+      </p:sp>
+      <p:sp>
+        <p:nvSpPr>
+          <p:cNvPr id="33" name="Freihandform 32"/>
+          <p:cNvSpPr/>
+          <p:nvPr/>
+        </p:nvSpPr>
+        <p:spPr>
+          <a:xfrm flipH="1">
+            <a:off x="2411760" y="4067033"/>
+            <a:ext cx="1201428" cy="1815152"/>
+          </a:xfrm>
+          <a:custGeom>
+            <a:avLst/>
+            <a:gdLst>
+              <a:gd name="connsiteX0" fmla="*/ 0 w 1173708"/>
+              <a:gd name="connsiteY0" fmla="*/ 1815152 h 1815152"/>
+              <a:gd name="connsiteX1" fmla="*/ 232012 w 1173708"/>
+              <a:gd name="connsiteY1" fmla="*/ 1705970 h 1815152"/>
+              <a:gd name="connsiteX2" fmla="*/ 614150 w 1173708"/>
+              <a:gd name="connsiteY2" fmla="*/ 1378424 h 1815152"/>
+              <a:gd name="connsiteX3" fmla="*/ 996287 w 1173708"/>
+              <a:gd name="connsiteY3" fmla="*/ 709683 h 1815152"/>
+              <a:gd name="connsiteX4" fmla="*/ 1173708 w 1173708"/>
+              <a:gd name="connsiteY4" fmla="*/ 0 h 1815152"/>
+            </a:gdLst>
+            <a:ahLst/>
+            <a:cxnLst>
+              <a:cxn ang="0">
+                <a:pos x="connsiteX0" y="connsiteY0"/>
+              </a:cxn>
+              <a:cxn ang="0">
+                <a:pos x="connsiteX1" y="connsiteY1"/>
+              </a:cxn>
+              <a:cxn ang="0">
+                <a:pos x="connsiteX2" y="connsiteY2"/>
+              </a:cxn>
+              <a:cxn ang="0">
+                <a:pos x="connsiteX3" y="connsiteY3"/>
+              </a:cxn>
+              <a:cxn ang="0">
+                <a:pos x="connsiteX4" y="connsiteY4"/>
+              </a:cxn>
+            </a:cxnLst>
+            <a:rect l="l" t="t" r="r" b="b"/>
+            <a:pathLst>
+              <a:path w="1173708" h="1815152">
+                <a:moveTo>
+                  <a:pt x="0" y="1815152"/>
+                </a:moveTo>
+                <a:cubicBezTo>
+                  <a:pt x="64827" y="1796955"/>
+                  <a:pt x="129654" y="1778758"/>
+                  <a:pt x="232012" y="1705970"/>
+                </a:cubicBezTo>
+                <a:cubicBezTo>
+                  <a:pt x="334370" y="1633182"/>
+                  <a:pt x="486771" y="1544472"/>
+                  <a:pt x="614150" y="1378424"/>
+                </a:cubicBezTo>
+                <a:cubicBezTo>
+                  <a:pt x="741529" y="1212376"/>
+                  <a:pt x="903027" y="939420"/>
+                  <a:pt x="996287" y="709683"/>
+                </a:cubicBezTo>
+                <a:cubicBezTo>
+                  <a:pt x="1089547" y="479946"/>
+                  <a:pt x="1131627" y="239973"/>
+                  <a:pt x="1173708" y="0"/>
+                </a:cubicBezTo>
+              </a:path>
+            </a:pathLst>
+          </a:custGeom>
+          <a:noFill/>
+          <a:ln w="76200"/>
+        </p:spPr>
+        <p:style>
+          <a:lnRef idx="2">
+            <a:schemeClr val="accent1">
+              <a:shade val="50000"/>
+            </a:schemeClr>
+          </a:lnRef>
+          <a:fillRef idx="1">
+            <a:schemeClr val="accent1"/>
+          </a:fillRef>
+          <a:effectRef idx="0">
+            <a:schemeClr val="accent1"/>
+          </a:effectRef>
+          <a:fontRef idx="minor">
+            <a:schemeClr val="lt1"/>
+          </a:fontRef>
+        </p:style>
+        <p:txBody>
+          <a:bodyPr rtlCol="0" anchor="ctr"/>
+          <a:lstStyle/>
+          <a:p>
+            <a:pPr algn="ctr"/>
+            <a:endParaRPr lang="en-US"/>
+          </a:p>
+        </p:txBody>
+      </p:sp>
+    </p:spTree>
+    <p:extLst>
+      <p:ext uri="{BB962C8B-B14F-4D97-AF65-F5344CB8AC3E}">
+        <p14:creationId xmlns:p14="http://schemas.microsoft.com/office/powerpoint/2010/main" val="1848459319"/>
+      </p:ext>
+    </p:extLst>
+  </p:cSld>
+  <p:clrMapOvr>
+    <a:masterClrMapping/>
+  </p:clrMapOvr>
+</p:sld>
+</file>
+
+<file path=ppt/slides/slide42.xml><?xml version="1.0" encoding="utf-8"?>
+<p:sld xmlns:a="http://schemas.openxmlformats.org/drawingml/2006/main" xmlns:r="http://schemas.openxmlformats.org/officeDocument/2006/relationships" xmlns:p="http://schemas.openxmlformats.org/presentationml/2006/main">
+  <p:cSld>
+    <p:spTree>
+      <p:nvGrpSpPr>
+        <p:cNvPr id="1" name=""/>
+        <p:cNvGrpSpPr/>
+        <p:nvPr/>
+      </p:nvGrpSpPr>
+      <p:grpSpPr>
+        <a:xfrm>
+          <a:off x="0" y="0"/>
+          <a:ext cx="0" cy="0"/>
+          <a:chOff x="0" y="0"/>
+          <a:chExt cx="0" cy="0"/>
+        </a:xfrm>
+      </p:grpSpPr>
+      <mc:AlternateContent xmlns:mc="http://schemas.openxmlformats.org/markup-compatibility/2006">
+        <mc:Choice xmlns:a14="http://schemas.microsoft.com/office/drawing/2010/main" Requires="a14">
+          <p:sp>
+            <p:nvSpPr>
+              <p:cNvPr id="4" name="Textfeld 3"/>
+              <p:cNvSpPr txBox="1"/>
+              <p:nvPr/>
+            </p:nvSpPr>
+            <p:spPr>
+              <a:xfrm>
+                <a:off x="967991" y="432755"/>
+                <a:ext cx="999860" cy="769441"/>
+              </a:xfrm>
+              <a:prstGeom prst="rect">
+                <a:avLst/>
+              </a:prstGeom>
+              <a:noFill/>
+            </p:spPr>
+            <p:txBody>
+              <a:bodyPr wrap="square" rtlCol="0">
+                <a:spAutoFit/>
+              </a:bodyPr>
+              <a:lstStyle/>
+              <a:p>
+                <a:pPr/>
+                <a14:m>
+                  <m:oMathPara xmlns:m="http://schemas.openxmlformats.org/officeDocument/2006/math">
+                    <m:oMathParaPr>
+                      <m:jc m:val="centerGroup"/>
+                    </m:oMathParaPr>
+                    <m:oMath xmlns:m="http://schemas.openxmlformats.org/officeDocument/2006/math">
+                      <m:r>
+                        <a:rPr lang="de-DE" sz="4400" b="0" i="1" smtClean="0">
+                          <a:latin typeface="Cambria Math"/>
+                        </a:rPr>
+                        <m:t>𝑀</m:t>
+                      </m:r>
+                    </m:oMath>
+                  </m:oMathPara>
+                </a14:m>
+                <a:endParaRPr lang="de-DE" sz="4400" b="0" dirty="0" smtClean="0"/>
+              </a:p>
+            </p:txBody>
+          </p:sp>
+        </mc:Choice>
+        <mc:Fallback>
+          <p:sp>
+            <p:nvSpPr>
+              <p:cNvPr id="4" name="Textfeld 3"/>
+              <p:cNvSpPr txBox="1">
+                <a:spLocks noRot="1" noChangeAspect="1" noMove="1" noResize="1" noEditPoints="1" noAdjustHandles="1" noChangeArrowheads="1" noChangeShapeType="1" noTextEdit="1"/>
+              </p:cNvSpPr>
+              <p:nvPr/>
+            </p:nvSpPr>
+            <p:spPr>
+              <a:xfrm>
+                <a:off x="967991" y="432755"/>
+                <a:ext cx="999860" cy="769441"/>
+              </a:xfrm>
+              <a:prstGeom prst="rect">
+                <a:avLst/>
+              </a:prstGeom>
+              <a:blipFill rotWithShape="1">
+                <a:blip r:embed="rId2"/>
+                <a:stretch>
+                  <a:fillRect/>
+                </a:stretch>
+              </a:blipFill>
+            </p:spPr>
+            <p:txBody>
+              <a:bodyPr/>
+              <a:lstStyle/>
+              <a:p>
+                <a:r>
+                  <a:rPr lang="en-US">
+                    <a:noFill/>
+                  </a:rPr>
+                  <a:t> </a:t>
+                </a:r>
+              </a:p>
+            </p:txBody>
+          </p:sp>
+        </mc:Fallback>
+      </mc:AlternateContent>
+      <mc:AlternateContent xmlns:mc="http://schemas.openxmlformats.org/markup-compatibility/2006">
+        <mc:Choice xmlns:a14="http://schemas.microsoft.com/office/drawing/2010/main" Requires="a14">
+          <p:sp>
+            <p:nvSpPr>
+              <p:cNvPr id="5" name="Textfeld 4"/>
+              <p:cNvSpPr txBox="1"/>
+              <p:nvPr/>
+            </p:nvSpPr>
+            <p:spPr>
+              <a:xfrm>
+                <a:off x="6623366" y="3959713"/>
+                <a:ext cx="819496" cy="769441"/>
+              </a:xfrm>
+              <a:prstGeom prst="rect">
+                <a:avLst/>
+              </a:prstGeom>
+              <a:noFill/>
+            </p:spPr>
+            <p:txBody>
+              <a:bodyPr wrap="square" rtlCol="0">
+                <a:spAutoFit/>
+              </a:bodyPr>
+              <a:lstStyle/>
+              <a:p>
+                <a:pPr/>
+                <a14:m>
+                  <m:oMathPara xmlns:m="http://schemas.openxmlformats.org/officeDocument/2006/math">
+                    <m:oMathParaPr>
+                      <m:jc m:val="centerGroup"/>
+                    </m:oMathParaPr>
+                    <m:oMath xmlns:m="http://schemas.openxmlformats.org/officeDocument/2006/math">
+                      <m:r>
+                        <a:rPr lang="de-DE" sz="4400" b="0" i="1" smtClean="0">
+                          <a:latin typeface="Cambria Math"/>
+                        </a:rPr>
+                        <m:t>𝑇</m:t>
+                      </m:r>
+                    </m:oMath>
+                  </m:oMathPara>
+                </a14:m>
+                <a:endParaRPr lang="en-US" sz="4400" dirty="0"/>
+              </a:p>
+            </p:txBody>
+          </p:sp>
+        </mc:Choice>
+        <mc:Fallback>
+          <p:sp>
+            <p:nvSpPr>
+              <p:cNvPr id="5" name="Textfeld 4"/>
+              <p:cNvSpPr txBox="1">
+                <a:spLocks noRot="1" noChangeAspect="1" noMove="1" noResize="1" noEditPoints="1" noAdjustHandles="1" noChangeArrowheads="1" noChangeShapeType="1" noTextEdit="1"/>
+              </p:cNvSpPr>
+              <p:nvPr/>
+            </p:nvSpPr>
+            <p:spPr>
+              <a:xfrm>
+                <a:off x="6623366" y="3959713"/>
+                <a:ext cx="819496" cy="769441"/>
+              </a:xfrm>
+              <a:prstGeom prst="rect">
+                <a:avLst/>
+              </a:prstGeom>
+              <a:blipFill rotWithShape="1">
+                <a:blip r:embed="rId3"/>
+                <a:stretch>
+                  <a:fillRect/>
+                </a:stretch>
+              </a:blipFill>
+            </p:spPr>
+            <p:txBody>
+              <a:bodyPr/>
+              <a:lstStyle/>
+              <a:p>
+                <a:r>
+                  <a:rPr lang="en-US">
+                    <a:noFill/>
+                  </a:rPr>
+                  <a:t> </a:t>
+                </a:r>
+              </a:p>
+            </p:txBody>
+          </p:sp>
+        </mc:Fallback>
+      </mc:AlternateContent>
+      <p:sp>
+        <p:nvSpPr>
+          <p:cNvPr id="6" name="Freihandform 5"/>
+          <p:cNvSpPr/>
+          <p:nvPr/>
+        </p:nvSpPr>
+        <p:spPr>
+          <a:xfrm>
+            <a:off x="908865" y="2136946"/>
+            <a:ext cx="5967389" cy="2441643"/>
+          </a:xfrm>
+          <a:custGeom>
+            <a:avLst/>
+            <a:gdLst>
+              <a:gd name="connsiteX0" fmla="*/ 0 w 4686300"/>
+              <a:gd name="connsiteY0" fmla="*/ 0 h 1468966"/>
+              <a:gd name="connsiteX1" fmla="*/ 1047750 w 4686300"/>
+              <a:gd name="connsiteY1" fmla="*/ 19050 h 1468966"/>
+              <a:gd name="connsiteX2" fmla="*/ 1943100 w 4686300"/>
+              <a:gd name="connsiteY2" fmla="*/ 228600 h 1468966"/>
+              <a:gd name="connsiteX3" fmla="*/ 2533650 w 4686300"/>
+              <a:gd name="connsiteY3" fmla="*/ 609600 h 1468966"/>
+              <a:gd name="connsiteX4" fmla="*/ 3086100 w 4686300"/>
+              <a:gd name="connsiteY4" fmla="*/ 1085850 h 1468966"/>
+              <a:gd name="connsiteX5" fmla="*/ 3390900 w 4686300"/>
+              <a:gd name="connsiteY5" fmla="*/ 1314450 h 1468966"/>
+              <a:gd name="connsiteX6" fmla="*/ 3848100 w 4686300"/>
+              <a:gd name="connsiteY6" fmla="*/ 1447800 h 1468966"/>
+              <a:gd name="connsiteX7" fmla="*/ 4686300 w 4686300"/>
+              <a:gd name="connsiteY7" fmla="*/ 1466850 h 1468966"/>
+            </a:gdLst>
+            <a:ahLst/>
+            <a:cxnLst>
+              <a:cxn ang="0">
+                <a:pos x="connsiteX0" y="connsiteY0"/>
+              </a:cxn>
+              <a:cxn ang="0">
+                <a:pos x="connsiteX1" y="connsiteY1"/>
+              </a:cxn>
+              <a:cxn ang="0">
+                <a:pos x="connsiteX2" y="connsiteY2"/>
+              </a:cxn>
+              <a:cxn ang="0">
+                <a:pos x="connsiteX3" y="connsiteY3"/>
+              </a:cxn>
+              <a:cxn ang="0">
+                <a:pos x="connsiteX4" y="connsiteY4"/>
+              </a:cxn>
+              <a:cxn ang="0">
+                <a:pos x="connsiteX5" y="connsiteY5"/>
+              </a:cxn>
+              <a:cxn ang="0">
+                <a:pos x="connsiteX6" y="connsiteY6"/>
+              </a:cxn>
+              <a:cxn ang="0">
+                <a:pos x="connsiteX7" y="connsiteY7"/>
+              </a:cxn>
+            </a:cxnLst>
+            <a:rect l="l" t="t" r="r" b="b"/>
+            <a:pathLst>
+              <a:path w="4686300" h="1468966">
+                <a:moveTo>
+                  <a:pt x="0" y="0"/>
+                </a:moveTo>
+                <a:lnTo>
+                  <a:pt x="1047750" y="19050"/>
+                </a:lnTo>
+                <a:cubicBezTo>
+                  <a:pt x="1371600" y="57150"/>
+                  <a:pt x="1695450" y="130175"/>
+                  <a:pt x="1943100" y="228600"/>
+                </a:cubicBezTo>
+                <a:cubicBezTo>
+                  <a:pt x="2190750" y="327025"/>
+                  <a:pt x="2343150" y="466725"/>
+                  <a:pt x="2533650" y="609600"/>
+                </a:cubicBezTo>
+                <a:cubicBezTo>
+                  <a:pt x="2724150" y="752475"/>
+                  <a:pt x="2943225" y="968375"/>
+                  <a:pt x="3086100" y="1085850"/>
+                </a:cubicBezTo>
+                <a:cubicBezTo>
+                  <a:pt x="3228975" y="1203325"/>
+                  <a:pt x="3263900" y="1254125"/>
+                  <a:pt x="3390900" y="1314450"/>
+                </a:cubicBezTo>
+                <a:cubicBezTo>
+                  <a:pt x="3517900" y="1374775"/>
+                  <a:pt x="3632200" y="1422400"/>
+                  <a:pt x="3848100" y="1447800"/>
+                </a:cubicBezTo>
+                <a:cubicBezTo>
+                  <a:pt x="4064000" y="1473200"/>
+                  <a:pt x="4375150" y="1470025"/>
+                  <a:pt x="4686300" y="1466850"/>
+                </a:cubicBezTo>
+              </a:path>
+            </a:pathLst>
+          </a:custGeom>
+          <a:noFill/>
+          <a:ln w="76200">
+            <a:solidFill>
+              <a:schemeClr val="accent1">
+                <a:lumMod val="60000"/>
+                <a:lumOff val="40000"/>
+              </a:schemeClr>
+            </a:solidFill>
+          </a:ln>
+        </p:spPr>
+        <p:style>
+          <a:lnRef idx="2">
+            <a:schemeClr val="accent1">
+              <a:shade val="50000"/>
+            </a:schemeClr>
+          </a:lnRef>
+          <a:fillRef idx="1">
+            <a:schemeClr val="accent1"/>
+          </a:fillRef>
+          <a:effectRef idx="0">
+            <a:schemeClr val="accent1"/>
+          </a:effectRef>
+          <a:fontRef idx="minor">
+            <a:schemeClr val="lt1"/>
+          </a:fontRef>
+        </p:style>
+        <p:txBody>
+          <a:bodyPr rtlCol="0" anchor="ctr"/>
+          <a:lstStyle/>
+          <a:p>
+            <a:pPr algn="ctr"/>
+            <a:endParaRPr lang="en-US"/>
+          </a:p>
+        </p:txBody>
+      </p:sp>
+      <mc:AlternateContent xmlns:mc="http://schemas.openxmlformats.org/markup-compatibility/2006">
+        <mc:Choice xmlns:a14="http://schemas.microsoft.com/office/drawing/2010/main" Requires="a14">
+          <p:sp>
+            <p:nvSpPr>
+              <p:cNvPr id="12" name="Textfeld 11"/>
+              <p:cNvSpPr txBox="1"/>
+              <p:nvPr/>
+            </p:nvSpPr>
+            <p:spPr>
+              <a:xfrm>
+                <a:off x="4089035" y="4783147"/>
+                <a:ext cx="1011847" cy="769441"/>
+              </a:xfrm>
+              <a:prstGeom prst="rect">
+                <a:avLst/>
+              </a:prstGeom>
+              <a:noFill/>
+            </p:spPr>
+            <p:txBody>
+              <a:bodyPr wrap="square" rtlCol="0">
+                <a:spAutoFit/>
+              </a:bodyPr>
+              <a:lstStyle/>
+              <a:p>
+                <a:pPr/>
+                <a14:m>
+                  <m:oMathPara xmlns:m="http://schemas.openxmlformats.org/officeDocument/2006/math">
+                    <m:oMathParaPr>
+                      <m:jc m:val="centerGroup"/>
+                    </m:oMathParaPr>
+                    <m:oMath xmlns:m="http://schemas.openxmlformats.org/officeDocument/2006/math">
+                      <m:sSub>
+                        <m:sSubPr>
+                          <m:ctrlPr>
+                            <a:rPr lang="de-DE" sz="4400" b="0" i="1" smtClean="0">
+                              <a:latin typeface="Cambria Math"/>
+                            </a:rPr>
+                          </m:ctrlPr>
+                        </m:sSubPr>
+                        <m:e>
+                          <m:r>
+                            <a:rPr lang="de-DE" sz="4400" b="0" i="1" smtClean="0">
+                              <a:latin typeface="Cambria Math"/>
+                            </a:rPr>
+                            <m:t>𝑇</m:t>
+                          </m:r>
+                        </m:e>
+                        <m:sub>
+                          <m:r>
+                            <a:rPr lang="de-DE" sz="4400" b="0" i="1" smtClean="0">
+                              <a:latin typeface="Cambria Math"/>
+                            </a:rPr>
+                            <m:t>𝑐</m:t>
+                          </m:r>
+                        </m:sub>
+                      </m:sSub>
+                    </m:oMath>
+                  </m:oMathPara>
+                </a14:m>
+                <a:endParaRPr lang="en-US" sz="4400" dirty="0"/>
+              </a:p>
+            </p:txBody>
+          </p:sp>
+        </mc:Choice>
+        <mc:Fallback>
+          <p:sp>
+            <p:nvSpPr>
+              <p:cNvPr id="12" name="Textfeld 11"/>
+              <p:cNvSpPr txBox="1">
+                <a:spLocks noRot="1" noChangeAspect="1" noMove="1" noResize="1" noEditPoints="1" noAdjustHandles="1" noChangeArrowheads="1" noChangeShapeType="1" noTextEdit="1"/>
+              </p:cNvSpPr>
+              <p:nvPr/>
+            </p:nvSpPr>
+            <p:spPr>
+              <a:xfrm>
+                <a:off x="4089035" y="4783147"/>
+                <a:ext cx="1011847" cy="769441"/>
+              </a:xfrm>
+              <a:prstGeom prst="rect">
+                <a:avLst/>
+              </a:prstGeom>
+              <a:blipFill rotWithShape="1">
+                <a:blip r:embed="rId4"/>
+                <a:stretch>
+                  <a:fillRect/>
+                </a:stretch>
+              </a:blipFill>
+            </p:spPr>
+            <p:txBody>
+              <a:bodyPr/>
+              <a:lstStyle/>
+              <a:p>
+                <a:r>
+                  <a:rPr lang="en-US">
+                    <a:noFill/>
+                  </a:rPr>
+                  <a:t> </a:t>
+                </a:r>
+              </a:p>
+            </p:txBody>
+          </p:sp>
+        </mc:Fallback>
+      </mc:AlternateContent>
+      <p:sp>
+        <p:nvSpPr>
+          <p:cNvPr id="18" name="Bogen 17"/>
+          <p:cNvSpPr/>
+          <p:nvPr/>
+        </p:nvSpPr>
+        <p:spPr>
+          <a:xfrm>
+            <a:off x="-2023597" y="2085231"/>
+            <a:ext cx="6575686" cy="4932052"/>
+          </a:xfrm>
+          <a:prstGeom prst="arc">
+            <a:avLst>
+              <a:gd name="adj1" fmla="val 16200000"/>
+              <a:gd name="adj2" fmla="val 97752"/>
+            </a:avLst>
+          </a:prstGeom>
+          <a:solidFill>
+            <a:schemeClr val="bg1"/>
+          </a:solidFill>
+          <a:ln w="76200">
+            <a:solidFill>
+              <a:schemeClr val="bg1"/>
+            </a:solidFill>
+          </a:ln>
+        </p:spPr>
+        <p:style>
+          <a:lnRef idx="1">
+            <a:schemeClr val="accent1"/>
+          </a:lnRef>
+          <a:fillRef idx="0">
+            <a:schemeClr val="accent1"/>
+          </a:fillRef>
+          <a:effectRef idx="0">
+            <a:schemeClr val="accent1"/>
+          </a:effectRef>
+          <a:fontRef idx="minor">
+            <a:schemeClr val="tx1"/>
+          </a:fontRef>
+        </p:style>
+        <p:txBody>
+          <a:bodyPr rtlCol="0" anchor="ctr"/>
+          <a:lstStyle/>
+          <a:p>
+            <a:pPr algn="ctr"/>
+            <a:endParaRPr lang="en-US"/>
+          </a:p>
+        </p:txBody>
+      </p:sp>
+      <p:sp>
+        <p:nvSpPr>
+          <p:cNvPr id="17" name="Bogen 16"/>
+          <p:cNvSpPr/>
+          <p:nvPr/>
+        </p:nvSpPr>
+        <p:spPr>
+          <a:xfrm>
+            <a:off x="-1980727" y="2060848"/>
+            <a:ext cx="6575686" cy="4932052"/>
+          </a:xfrm>
+          <a:prstGeom prst="arc">
+            <a:avLst>
+              <a:gd name="adj1" fmla="val 16200000"/>
+              <a:gd name="adj2" fmla="val 94036"/>
+            </a:avLst>
+          </a:prstGeom>
+          <a:ln w="76200"/>
+        </p:spPr>
+        <p:style>
+          <a:lnRef idx="1">
+            <a:schemeClr val="accent1"/>
+          </a:lnRef>
+          <a:fillRef idx="0">
+            <a:schemeClr val="accent1"/>
+          </a:fillRef>
+          <a:effectRef idx="0">
+            <a:schemeClr val="accent1"/>
+          </a:effectRef>
+          <a:fontRef idx="minor">
+            <a:schemeClr val="tx1"/>
+          </a:fontRef>
+        </p:style>
+        <p:txBody>
+          <a:bodyPr rtlCol="0" anchor="ctr"/>
+          <a:lstStyle/>
+          <a:p>
+            <a:pPr algn="ctr"/>
+            <a:endParaRPr lang="en-US"/>
+          </a:p>
+        </p:txBody>
+      </p:sp>
+      <p:cxnSp>
+        <p:nvCxnSpPr>
+          <p:cNvPr id="3" name="Gerade Verbindung mit Pfeil 2"/>
+          <p:cNvCxnSpPr/>
+          <p:nvPr/>
+        </p:nvCxnSpPr>
+        <p:spPr>
+          <a:xfrm>
+            <a:off x="1298946" y="4595269"/>
+            <a:ext cx="6592026" cy="0"/>
+          </a:xfrm>
+          <a:prstGeom prst="straightConnector1">
+            <a:avLst/>
+          </a:prstGeom>
+          <a:ln w="76200">
+            <a:solidFill>
+              <a:schemeClr val="tx1"/>
+            </a:solidFill>
+            <a:tailEnd type="arrow"/>
+          </a:ln>
+        </p:spPr>
+        <p:style>
+          <a:lnRef idx="1">
+            <a:schemeClr val="accent1"/>
+          </a:lnRef>
+          <a:fillRef idx="0">
+            <a:schemeClr val="accent1"/>
+          </a:fillRef>
+          <a:effectRef idx="0">
+            <a:schemeClr val="accent1"/>
+          </a:effectRef>
+          <a:fontRef idx="minor">
+            <a:schemeClr val="tx1"/>
+          </a:fontRef>
+        </p:style>
+      </p:cxnSp>
+      <p:cxnSp>
+        <p:nvCxnSpPr>
+          <p:cNvPr id="2" name="Gerade Verbindung mit Pfeil 1"/>
+          <p:cNvCxnSpPr/>
+          <p:nvPr/>
+        </p:nvCxnSpPr>
+        <p:spPr>
+          <a:xfrm flipV="1">
+            <a:off x="1264246" y="1202196"/>
+            <a:ext cx="34700" cy="3393073"/>
+          </a:xfrm>
+          <a:prstGeom prst="straightConnector1">
+            <a:avLst/>
+          </a:prstGeom>
+          <a:ln w="76200">
+            <a:solidFill>
+              <a:schemeClr val="tx1"/>
+            </a:solidFill>
+            <a:tailEnd type="arrow"/>
+          </a:ln>
+        </p:spPr>
+        <p:style>
+          <a:lnRef idx="1">
+            <a:schemeClr val="accent1"/>
+          </a:lnRef>
+          <a:fillRef idx="0">
+            <a:schemeClr val="accent1"/>
+          </a:fillRef>
+          <a:effectRef idx="0">
+            <a:schemeClr val="accent1"/>
+          </a:effectRef>
+          <a:fontRef idx="minor">
+            <a:schemeClr val="tx1"/>
+          </a:fontRef>
+        </p:style>
+      </p:cxnSp>
+      <p:sp>
+        <p:nvSpPr>
+          <p:cNvPr id="19" name="Rechteck 18"/>
+          <p:cNvSpPr/>
+          <p:nvPr/>
+        </p:nvSpPr>
+        <p:spPr>
+          <a:xfrm>
+            <a:off x="862654" y="1858712"/>
+            <a:ext cx="355381" cy="648072"/>
+          </a:xfrm>
+          <a:prstGeom prst="rect">
+            <a:avLst/>
+          </a:prstGeom>
+          <a:solidFill>
+            <a:schemeClr val="bg1"/>
+          </a:solidFill>
+          <a:ln>
+            <a:solidFill>
+              <a:schemeClr val="bg1"/>
+            </a:solidFill>
+          </a:ln>
+        </p:spPr>
+        <p:style>
+          <a:lnRef idx="2">
+            <a:schemeClr val="accent1">
+              <a:shade val="50000"/>
+            </a:schemeClr>
+          </a:lnRef>
+          <a:fillRef idx="1">
+            <a:schemeClr val="accent1"/>
+          </a:fillRef>
+          <a:effectRef idx="0">
+            <a:schemeClr val="accent1"/>
+          </a:effectRef>
+          <a:fontRef idx="minor">
+            <a:schemeClr val="lt1"/>
+          </a:fontRef>
+        </p:style>
+        <p:txBody>
+          <a:bodyPr rtlCol="0" anchor="ctr"/>
+          <a:lstStyle/>
+          <a:p>
+            <a:pPr algn="ctr"/>
+            <a:endParaRPr lang="en-US"/>
+          </a:p>
+        </p:txBody>
+      </p:sp>
+      <mc:AlternateContent xmlns:mc="http://schemas.openxmlformats.org/markup-compatibility/2006">
+        <mc:Choice xmlns:a14="http://schemas.microsoft.com/office/drawing/2010/main" Requires="a14">
+          <p:sp>
+            <p:nvSpPr>
+              <p:cNvPr id="20" name="Textfeld 19"/>
+              <p:cNvSpPr txBox="1"/>
+              <p:nvPr/>
+            </p:nvSpPr>
+            <p:spPr>
+              <a:xfrm>
+                <a:off x="4030112" y="2129291"/>
+                <a:ext cx="1794914" cy="769441"/>
+              </a:xfrm>
+              <a:prstGeom prst="rect">
+                <a:avLst/>
+              </a:prstGeom>
+              <a:noFill/>
+            </p:spPr>
+            <p:txBody>
+              <a:bodyPr wrap="none" rtlCol="0">
+                <a:spAutoFit/>
+              </a:bodyPr>
+              <a:lstStyle/>
+              <a:p>
+                <a14:m>
+                  <m:oMathPara xmlns:m="http://schemas.openxmlformats.org/officeDocument/2006/math">
+                    <m:oMathParaPr>
+                      <m:jc m:val="centerGroup"/>
+                    </m:oMathParaPr>
+                    <m:oMath xmlns:m="http://schemas.openxmlformats.org/officeDocument/2006/math">
+                      <m:r>
+                        <a:rPr lang="de-DE" sz="4400" b="1" i="1" smtClean="0">
+                          <a:solidFill>
+                            <a:schemeClr val="accent1">
+                              <a:lumMod val="60000"/>
+                              <a:lumOff val="40000"/>
+                            </a:schemeClr>
+                          </a:solidFill>
+                          <a:latin typeface="Cambria Math"/>
+                        </a:rPr>
+                        <m:t>𝑩</m:t>
+                      </m:r>
+                      <m:r>
+                        <a:rPr lang="de-DE" sz="4400" b="1" i="1" smtClean="0">
+                          <a:solidFill>
+                            <a:schemeClr val="accent1">
+                              <a:lumMod val="60000"/>
+                              <a:lumOff val="40000"/>
+                            </a:schemeClr>
+                          </a:solidFill>
+                          <a:latin typeface="Cambria Math"/>
+                        </a:rPr>
+                        <m:t>≠</m:t>
+                      </m:r>
+                      <m:r>
+                        <a:rPr lang="de-DE" sz="4400" b="1" i="1" smtClean="0">
+                          <a:solidFill>
+                            <a:schemeClr val="accent1">
+                              <a:lumMod val="60000"/>
+                              <a:lumOff val="40000"/>
+                            </a:schemeClr>
+                          </a:solidFill>
+                          <a:latin typeface="Cambria Math"/>
+                        </a:rPr>
+                        <m:t>𝟎</m:t>
+                      </m:r>
+                    </m:oMath>
+                  </m:oMathPara>
+                </a14:m>
+                <a:endParaRPr lang="en-US" sz="4400" b="1" dirty="0">
+                  <a:solidFill>
+                    <a:schemeClr val="accent1">
+                      <a:lumMod val="60000"/>
+                      <a:lumOff val="40000"/>
+                    </a:schemeClr>
+                  </a:solidFill>
+                </a:endParaRPr>
+              </a:p>
+            </p:txBody>
+          </p:sp>
+        </mc:Choice>
+        <mc:Fallback>
+          <p:sp>
+            <p:nvSpPr>
+              <p:cNvPr id="20" name="Textfeld 19"/>
+              <p:cNvSpPr txBox="1">
+                <a:spLocks noRot="1" noChangeAspect="1" noMove="1" noResize="1" noEditPoints="1" noAdjustHandles="1" noChangeArrowheads="1" noChangeShapeType="1" noTextEdit="1"/>
+              </p:cNvSpPr>
+              <p:nvPr/>
+            </p:nvSpPr>
+            <p:spPr>
+              <a:xfrm>
+                <a:off x="4030112" y="2129291"/>
+                <a:ext cx="1794914" cy="769441"/>
+              </a:xfrm>
+              <a:prstGeom prst="rect">
+                <a:avLst/>
+              </a:prstGeom>
+              <a:blipFill rotWithShape="1">
+                <a:blip r:embed="rId5"/>
+                <a:stretch>
+                  <a:fillRect/>
+                </a:stretch>
+              </a:blipFill>
+            </p:spPr>
+            <p:txBody>
+              <a:bodyPr/>
+              <a:lstStyle/>
+              <a:p>
+                <a:r>
+                  <a:rPr lang="en-US">
+                    <a:noFill/>
+                  </a:rPr>
+                  <a:t> </a:t>
+                </a:r>
+              </a:p>
+            </p:txBody>
+          </p:sp>
+        </mc:Fallback>
+      </mc:AlternateContent>
+      <mc:AlternateContent xmlns:mc="http://schemas.openxmlformats.org/markup-compatibility/2006">
+        <mc:Choice xmlns:a14="http://schemas.microsoft.com/office/drawing/2010/main" Requires="a14">
+          <p:sp>
+            <p:nvSpPr>
+              <p:cNvPr id="21" name="Textfeld 20"/>
+              <p:cNvSpPr txBox="1"/>
+              <p:nvPr/>
+            </p:nvSpPr>
+            <p:spPr>
+              <a:xfrm>
+                <a:off x="1967851" y="2885502"/>
+                <a:ext cx="1794914" cy="769441"/>
+              </a:xfrm>
+              <a:prstGeom prst="rect">
+                <a:avLst/>
+              </a:prstGeom>
+              <a:noFill/>
+            </p:spPr>
+            <p:txBody>
+              <a:bodyPr wrap="none" rtlCol="0">
+                <a:spAutoFit/>
+              </a:bodyPr>
+              <a:lstStyle/>
+              <a:p>
+                <a14:m>
+                  <m:oMathPara xmlns:m="http://schemas.openxmlformats.org/officeDocument/2006/math">
+                    <m:oMathParaPr>
+                      <m:jc m:val="centerGroup"/>
+                    </m:oMathParaPr>
+                    <m:oMath xmlns:m="http://schemas.openxmlformats.org/officeDocument/2006/math">
+                      <m:r>
+                        <a:rPr lang="de-DE" sz="4400" b="1" i="1" smtClean="0">
+                          <a:solidFill>
+                            <a:schemeClr val="accent1">
+                              <a:lumMod val="75000"/>
+                            </a:schemeClr>
+                          </a:solidFill>
+                          <a:latin typeface="Cambria Math"/>
+                        </a:rPr>
+                        <m:t>𝑩</m:t>
+                      </m:r>
+                      <m:r>
+                        <a:rPr lang="de-DE" sz="4400" b="1" i="1" smtClean="0">
+                          <a:solidFill>
+                            <a:schemeClr val="accent1">
+                              <a:lumMod val="75000"/>
+                            </a:schemeClr>
+                          </a:solidFill>
+                          <a:latin typeface="Cambria Math"/>
+                        </a:rPr>
+                        <m:t>=</m:t>
+                      </m:r>
+                      <m:r>
+                        <a:rPr lang="de-DE" sz="4400" b="1" i="1" smtClean="0">
+                          <a:solidFill>
+                            <a:schemeClr val="accent1">
+                              <a:lumMod val="75000"/>
+                            </a:schemeClr>
+                          </a:solidFill>
+                          <a:latin typeface="Cambria Math"/>
+                        </a:rPr>
+                        <m:t>𝟎</m:t>
+                      </m:r>
+                    </m:oMath>
+                  </m:oMathPara>
+                </a14:m>
+                <a:endParaRPr lang="en-US" sz="4400" b="1" dirty="0">
+                  <a:solidFill>
+                    <a:schemeClr val="accent1">
+                      <a:lumMod val="75000"/>
+                    </a:schemeClr>
+                  </a:solidFill>
+                </a:endParaRPr>
+              </a:p>
+            </p:txBody>
+          </p:sp>
+        </mc:Choice>
+        <mc:Fallback>
+          <p:sp>
+            <p:nvSpPr>
+              <p:cNvPr id="21" name="Textfeld 20"/>
+              <p:cNvSpPr txBox="1">
+                <a:spLocks noRot="1" noChangeAspect="1" noMove="1" noResize="1" noEditPoints="1" noAdjustHandles="1" noChangeArrowheads="1" noChangeShapeType="1" noTextEdit="1"/>
+              </p:cNvSpPr>
+              <p:nvPr/>
+            </p:nvSpPr>
+            <p:spPr>
+              <a:xfrm>
+                <a:off x="1967851" y="2885502"/>
+                <a:ext cx="1794914" cy="769441"/>
+              </a:xfrm>
+              <a:prstGeom prst="rect">
+                <a:avLst/>
+              </a:prstGeom>
+              <a:blipFill rotWithShape="1">
+                <a:blip r:embed="rId6"/>
+                <a:stretch>
+                  <a:fillRect/>
+                </a:stretch>
+              </a:blipFill>
+            </p:spPr>
+            <p:txBody>
+              <a:bodyPr/>
+              <a:lstStyle/>
+              <a:p>
+                <a:r>
+                  <a:rPr lang="en-US">
+                    <a:noFill/>
+                  </a:rPr>
+                  <a:t> </a:t>
+                </a:r>
+              </a:p>
+            </p:txBody>
+          </p:sp>
+        </mc:Fallback>
+      </mc:AlternateContent>
+      <p:cxnSp>
+        <p:nvCxnSpPr>
+          <p:cNvPr id="23" name="Gerade Verbindung 22"/>
+          <p:cNvCxnSpPr/>
+          <p:nvPr/>
+        </p:nvCxnSpPr>
+        <p:spPr>
+          <a:xfrm flipV="1">
+            <a:off x="4594959" y="4413829"/>
+            <a:ext cx="0" cy="362880"/>
+          </a:xfrm>
+          <a:prstGeom prst="line">
+            <a:avLst/>
+          </a:prstGeom>
+          <a:ln w="57150">
+            <a:solidFill>
+              <a:schemeClr val="tx1"/>
+            </a:solidFill>
+          </a:ln>
+        </p:spPr>
+        <p:style>
+          <a:lnRef idx="1">
+            <a:schemeClr val="accent1"/>
+          </a:lnRef>
+          <a:fillRef idx="0">
+            <a:schemeClr val="accent1"/>
+          </a:fillRef>
+          <a:effectRef idx="0">
+            <a:schemeClr val="accent1"/>
+          </a:effectRef>
+          <a:fontRef idx="minor">
+            <a:schemeClr val="tx1"/>
+          </a:fontRef>
+        </p:style>
+      </p:cxnSp>
+    </p:spTree>
+    <p:extLst>
+      <p:ext uri="{BB962C8B-B14F-4D97-AF65-F5344CB8AC3E}">
+        <p14:creationId xmlns:p14="http://schemas.microsoft.com/office/powerpoint/2010/main" val="3677143558"/>
+      </p:ext>
+    </p:extLst>
+  </p:cSld>
+  <p:clrMapOvr>
+    <a:masterClrMapping/>
+  </p:clrMapOvr>
 </p:sld>
 </file>
 

</xml_diff>